<commit_message>
some PPT changes from ASE
</commit_message>
<xml_diff>
--- a/courses/ase/lectures/Ch10 Dependable systems.pptx
+++ b/courses/ase/lectures/Ch10 Dependable systems.pptx
@@ -156,6 +156,22 @@
       </a:defRPr>
     </a:lvl9pPr>
   </p:defaultTextStyle>
+  <p:extLst>
+    <p:ext uri="{EFAFB233-063F-42B5-8137-9DF3F51BA10A}">
+      <p15:sldGuideLst xmlns:p15="http://schemas.microsoft.com/office/powerpoint/2012/main">
+        <p15:guide id="1" orient="horz" pos="2160">
+          <p15:clr>
+            <a:srgbClr val="A4A3A4"/>
+          </p15:clr>
+        </p15:guide>
+        <p15:guide id="2" pos="2880">
+          <p15:clr>
+            <a:srgbClr val="A4A3A4"/>
+          </p15:clr>
+        </p15:guide>
+      </p15:sldGuideLst>
+    </p:ext>
+  </p:extLst>
 </p:presentation>
 </file>
 
@@ -241,7 +257,7 @@
           <a:p>
             <a:fld id="{9A5D8D83-B88B-724B-9E4E-26099BBF6014}" type="datetimeFigureOut">
               <a:rPr lang="en-US" smtClean="0"/>
-              <a:t>30/10/2014</a:t>
+              <a:t>12/30/20</a:t>
             </a:fld>
             <a:endParaRPr lang="en-US"/>
           </a:p>
@@ -407,7 +423,7 @@
           <a:p>
             <a:fld id="{8D1C8FB4-96C8-0F41-9BA6-53F7040F6BBF}" type="datetimeFigureOut">
               <a:rPr lang="en-US" smtClean="0"/>
-              <a:t>30/10/2014</a:t>
+              <a:t>12/30/20</a:t>
             </a:fld>
             <a:endParaRPr lang="en-US"/>
           </a:p>
@@ -471,35 +487,35 @@
           <a:p>
             <a:pPr lvl="0"/>
             <a:r>
-              <a:rPr lang="en-GB" smtClean="0"/>
+              <a:rPr lang="en-GB"/>
               <a:t>Click to edit Master text styles</a:t>
             </a:r>
           </a:p>
           <a:p>
             <a:pPr lvl="1"/>
             <a:r>
-              <a:rPr lang="en-GB" smtClean="0"/>
+              <a:rPr lang="en-GB"/>
               <a:t>Second level</a:t>
             </a:r>
           </a:p>
           <a:p>
             <a:pPr lvl="2"/>
             <a:r>
-              <a:rPr lang="en-GB" smtClean="0"/>
+              <a:rPr lang="en-GB"/>
               <a:t>Third level</a:t>
             </a:r>
           </a:p>
           <a:p>
             <a:pPr lvl="3"/>
             <a:r>
-              <a:rPr lang="en-GB" smtClean="0"/>
+              <a:rPr lang="en-GB"/>
               <a:t>Fourth level</a:t>
             </a:r>
           </a:p>
           <a:p>
             <a:pPr lvl="4"/>
             <a:r>
-              <a:rPr lang="en-GB" smtClean="0"/>
+              <a:rPr lang="en-GB"/>
               <a:t>Fifth level</a:t>
             </a:r>
             <a:endParaRPr lang="en-US"/>
@@ -948,7 +964,7 @@
           <a:lstStyle/>
           <a:p>
             <a:r>
-              <a:rPr lang="en-GB" smtClean="0"/>
+              <a:rPr lang="en-GB"/>
               <a:t>Click to edit Master title style</a:t>
             </a:r>
             <a:endParaRPr lang="en-US"/>
@@ -1070,7 +1086,7 @@
           </a:lstStyle>
           <a:p>
             <a:r>
-              <a:rPr lang="en-GB" smtClean="0"/>
+              <a:rPr lang="en-GB"/>
               <a:t>Click to edit Master subtitle style</a:t>
             </a:r>
             <a:endParaRPr lang="en-US"/>
@@ -1097,7 +1113,7 @@
           </a:lstStyle>
           <a:p>
             <a:r>
-              <a:rPr lang="en-GB" smtClean="0"/>
+              <a:rPr lang="en-GB"/>
               <a:t>30/10/2014</a:t>
             </a:r>
             <a:endParaRPr lang="en-US"/>
@@ -1124,10 +1140,9 @@
           </a:lstStyle>
           <a:p>
             <a:r>
-              <a:rPr lang="en-US" smtClean="0"/>
+              <a:rPr lang="en-US"/>
               <a:t>Chapter 10 Dependable Systems</a:t>
             </a:r>
-            <a:endParaRPr lang="en-US"/>
           </a:p>
         </p:txBody>
       </p:sp>
@@ -1163,16 +1178,9 @@
   <p:clrMapOvr>
     <a:masterClrMapping/>
   </p:clrMapOvr>
-  <p:transition xmlns:p14="http://schemas.microsoft.com/office/powerpoint/2010/main" spd="med">
+  <p:transition spd="med">
     <p:wipe dir="r"/>
   </p:transition>
-  <p:timing>
-    <p:tnLst>
-      <p:par>
-        <p:cTn xmlns:p14="http://schemas.microsoft.com/office/powerpoint/2010/main" id="1" dur="indefinite" restart="never" nodeType="tmRoot"/>
-      </p:par>
-    </p:tnLst>
-  </p:timing>
 </p:sldLayout>
 </file>
 
@@ -1209,7 +1217,7 @@
           <a:lstStyle/>
           <a:p>
             <a:r>
-              <a:rPr lang="en-GB" smtClean="0"/>
+              <a:rPr lang="en-GB"/>
               <a:t>Click to edit Master title style</a:t>
             </a:r>
             <a:endParaRPr lang="en-US"/>
@@ -1241,35 +1249,35 @@
           <a:p>
             <a:pPr lvl="0"/>
             <a:r>
-              <a:rPr lang="en-GB" smtClean="0"/>
+              <a:rPr lang="en-GB"/>
               <a:t>Click to edit Master text styles</a:t>
             </a:r>
           </a:p>
           <a:p>
             <a:pPr lvl="1"/>
             <a:r>
-              <a:rPr lang="en-GB" smtClean="0"/>
+              <a:rPr lang="en-GB"/>
               <a:t>Second level</a:t>
             </a:r>
           </a:p>
           <a:p>
             <a:pPr lvl="2"/>
             <a:r>
-              <a:rPr lang="en-GB" smtClean="0"/>
+              <a:rPr lang="en-GB"/>
               <a:t>Third level</a:t>
             </a:r>
           </a:p>
           <a:p>
             <a:pPr lvl="3"/>
             <a:r>
-              <a:rPr lang="en-GB" smtClean="0"/>
+              <a:rPr lang="en-GB"/>
               <a:t>Fourth level</a:t>
             </a:r>
           </a:p>
           <a:p>
             <a:pPr lvl="4"/>
             <a:r>
-              <a:rPr lang="en-GB" smtClean="0"/>
+              <a:rPr lang="en-GB"/>
               <a:t>Fifth level</a:t>
             </a:r>
             <a:endParaRPr lang="en-US"/>
@@ -1296,7 +1304,7 @@
           </a:lstStyle>
           <a:p>
             <a:r>
-              <a:rPr lang="en-GB" smtClean="0"/>
+              <a:rPr lang="en-GB"/>
               <a:t>30/10/2014</a:t>
             </a:r>
             <a:endParaRPr lang="en-US"/>
@@ -1323,10 +1331,9 @@
           </a:lstStyle>
           <a:p>
             <a:r>
-              <a:rPr lang="en-US" smtClean="0"/>
+              <a:rPr lang="en-US"/>
               <a:t>Chapter 10 Dependable Systems</a:t>
             </a:r>
-            <a:endParaRPr lang="en-US"/>
           </a:p>
         </p:txBody>
       </p:sp>
@@ -1362,16 +1369,9 @@
   <p:clrMapOvr>
     <a:masterClrMapping/>
   </p:clrMapOvr>
-  <p:transition xmlns:p14="http://schemas.microsoft.com/office/powerpoint/2010/main" spd="med">
+  <p:transition spd="med">
     <p:wipe dir="r"/>
   </p:transition>
-  <p:timing>
-    <p:tnLst>
-      <p:par>
-        <p:cTn xmlns:p14="http://schemas.microsoft.com/office/powerpoint/2010/main" id="1" dur="indefinite" restart="never" nodeType="tmRoot"/>
-      </p:par>
-    </p:tnLst>
-  </p:timing>
 </p:sldLayout>
 </file>
 
@@ -1413,7 +1413,7 @@
           <a:lstStyle/>
           <a:p>
             <a:r>
-              <a:rPr lang="en-GB" smtClean="0"/>
+              <a:rPr lang="en-GB"/>
               <a:t>Click to edit Master title style</a:t>
             </a:r>
             <a:endParaRPr lang="en-US"/>
@@ -1445,35 +1445,35 @@
           <a:p>
             <a:pPr lvl="0"/>
             <a:r>
-              <a:rPr lang="en-GB" smtClean="0"/>
+              <a:rPr lang="en-GB"/>
               <a:t>Click to edit Master text styles</a:t>
             </a:r>
           </a:p>
           <a:p>
             <a:pPr lvl="1"/>
             <a:r>
-              <a:rPr lang="en-GB" smtClean="0"/>
+              <a:rPr lang="en-GB"/>
               <a:t>Second level</a:t>
             </a:r>
           </a:p>
           <a:p>
             <a:pPr lvl="2"/>
             <a:r>
-              <a:rPr lang="en-GB" smtClean="0"/>
+              <a:rPr lang="en-GB"/>
               <a:t>Third level</a:t>
             </a:r>
           </a:p>
           <a:p>
             <a:pPr lvl="3"/>
             <a:r>
-              <a:rPr lang="en-GB" smtClean="0"/>
+              <a:rPr lang="en-GB"/>
               <a:t>Fourth level</a:t>
             </a:r>
           </a:p>
           <a:p>
             <a:pPr lvl="4"/>
             <a:r>
-              <a:rPr lang="en-GB" smtClean="0"/>
+              <a:rPr lang="en-GB"/>
               <a:t>Fifth level</a:t>
             </a:r>
             <a:endParaRPr lang="en-US"/>
@@ -1500,7 +1500,7 @@
           </a:lstStyle>
           <a:p>
             <a:r>
-              <a:rPr lang="en-GB" smtClean="0"/>
+              <a:rPr lang="en-GB"/>
               <a:t>30/10/2014</a:t>
             </a:r>
             <a:endParaRPr lang="en-US"/>
@@ -1527,10 +1527,9 @@
           </a:lstStyle>
           <a:p>
             <a:r>
-              <a:rPr lang="en-US" smtClean="0"/>
+              <a:rPr lang="en-US"/>
               <a:t>Chapter 10 Dependable Systems</a:t>
             </a:r>
-            <a:endParaRPr lang="en-US"/>
           </a:p>
         </p:txBody>
       </p:sp>
@@ -1566,16 +1565,9 @@
   <p:clrMapOvr>
     <a:masterClrMapping/>
   </p:clrMapOvr>
-  <p:transition xmlns:p14="http://schemas.microsoft.com/office/powerpoint/2010/main" spd="med">
+  <p:transition spd="med">
     <p:wipe dir="r"/>
   </p:transition>
-  <p:timing>
-    <p:tnLst>
-      <p:par>
-        <p:cTn xmlns:p14="http://schemas.microsoft.com/office/powerpoint/2010/main" id="1" dur="indefinite" restart="never" nodeType="tmRoot"/>
-      </p:par>
-    </p:tnLst>
-  </p:timing>
 </p:sldLayout>
 </file>
 
@@ -1612,7 +1604,7 @@
           <a:lstStyle/>
           <a:p>
             <a:r>
-              <a:rPr lang="en-GB" smtClean="0"/>
+              <a:rPr lang="en-GB"/>
               <a:t>Click to edit Master title style</a:t>
             </a:r>
             <a:endParaRPr lang="en-US" dirty="0"/>
@@ -1706,35 +1698,35 @@
           <a:p>
             <a:pPr lvl="0"/>
             <a:r>
-              <a:rPr lang="en-GB" smtClean="0"/>
+              <a:rPr lang="en-GB"/>
               <a:t>Click to edit Master text styles</a:t>
             </a:r>
           </a:p>
           <a:p>
             <a:pPr lvl="1"/>
             <a:r>
-              <a:rPr lang="en-GB" smtClean="0"/>
+              <a:rPr lang="en-GB"/>
               <a:t>Second level</a:t>
             </a:r>
           </a:p>
           <a:p>
             <a:pPr lvl="2"/>
             <a:r>
-              <a:rPr lang="en-GB" smtClean="0"/>
+              <a:rPr lang="en-GB"/>
               <a:t>Third level</a:t>
             </a:r>
           </a:p>
           <a:p>
             <a:pPr lvl="3"/>
             <a:r>
-              <a:rPr lang="en-GB" smtClean="0"/>
+              <a:rPr lang="en-GB"/>
               <a:t>Fourth level</a:t>
             </a:r>
           </a:p>
           <a:p>
             <a:pPr lvl="4"/>
             <a:r>
-              <a:rPr lang="en-GB" smtClean="0"/>
+              <a:rPr lang="en-GB"/>
               <a:t>Fifth level</a:t>
             </a:r>
             <a:endParaRPr lang="en-US" dirty="0"/>
@@ -1761,7 +1753,7 @@
           </a:lstStyle>
           <a:p>
             <a:r>
-              <a:rPr lang="en-GB" smtClean="0"/>
+              <a:rPr lang="en-GB"/>
               <a:t>30/10/2014</a:t>
             </a:r>
             <a:endParaRPr lang="en-US"/>
@@ -1788,10 +1780,9 @@
           </a:lstStyle>
           <a:p>
             <a:r>
-              <a:rPr lang="en-US" smtClean="0"/>
+              <a:rPr lang="en-US"/>
               <a:t>Chapter 10 Dependable Systems</a:t>
             </a:r>
-            <a:endParaRPr lang="en-US"/>
           </a:p>
         </p:txBody>
       </p:sp>
@@ -1827,16 +1818,9 @@
   <p:clrMapOvr>
     <a:masterClrMapping/>
   </p:clrMapOvr>
-  <p:transition xmlns:p14="http://schemas.microsoft.com/office/powerpoint/2010/main" spd="med">
+  <p:transition spd="med">
     <p:wipe dir="r"/>
   </p:transition>
-  <p:timing>
-    <p:tnLst>
-      <p:par>
-        <p:cTn xmlns:p14="http://schemas.microsoft.com/office/powerpoint/2010/main" id="1" dur="indefinite" restart="never" nodeType="tmRoot"/>
-      </p:par>
-    </p:tnLst>
-  </p:timing>
 </p:sldLayout>
 </file>
 
@@ -1882,7 +1866,7 @@
           </a:lstStyle>
           <a:p>
             <a:r>
-              <a:rPr lang="en-GB" smtClean="0"/>
+              <a:rPr lang="en-GB"/>
               <a:t>Click to edit Master title style</a:t>
             </a:r>
             <a:endParaRPr lang="en-US"/>
@@ -2005,7 +1989,7 @@
           <a:p>
             <a:pPr lvl="0"/>
             <a:r>
-              <a:rPr lang="en-GB" smtClean="0"/>
+              <a:rPr lang="en-GB"/>
               <a:t>Click to edit Master text styles</a:t>
             </a:r>
           </a:p>
@@ -2031,7 +2015,7 @@
           </a:lstStyle>
           <a:p>
             <a:r>
-              <a:rPr lang="en-GB" smtClean="0"/>
+              <a:rPr lang="en-GB"/>
               <a:t>30/10/2014</a:t>
             </a:r>
             <a:endParaRPr lang="en-US"/>
@@ -2058,10 +2042,9 @@
           </a:lstStyle>
           <a:p>
             <a:r>
-              <a:rPr lang="en-US" smtClean="0"/>
+              <a:rPr lang="en-US"/>
               <a:t>Chapter 10 Dependable Systems</a:t>
             </a:r>
-            <a:endParaRPr lang="en-US"/>
           </a:p>
         </p:txBody>
       </p:sp>
@@ -2097,16 +2080,9 @@
   <p:clrMapOvr>
     <a:masterClrMapping/>
   </p:clrMapOvr>
-  <p:transition xmlns:p14="http://schemas.microsoft.com/office/powerpoint/2010/main" spd="med">
+  <p:transition spd="med">
     <p:wipe dir="r"/>
   </p:transition>
-  <p:timing>
-    <p:tnLst>
-      <p:par>
-        <p:cTn xmlns:p14="http://schemas.microsoft.com/office/powerpoint/2010/main" id="1" dur="indefinite" restart="never" nodeType="tmRoot"/>
-      </p:par>
-    </p:tnLst>
-  </p:timing>
 </p:sldLayout>
 </file>
 
@@ -2143,7 +2119,7 @@
           <a:lstStyle/>
           <a:p>
             <a:r>
-              <a:rPr lang="en-GB" smtClean="0"/>
+              <a:rPr lang="en-GB"/>
               <a:t>Click to edit Master title style</a:t>
             </a:r>
             <a:endParaRPr lang="en-US"/>
@@ -2203,35 +2179,35 @@
           <a:p>
             <a:pPr lvl="0"/>
             <a:r>
-              <a:rPr lang="en-GB" smtClean="0"/>
+              <a:rPr lang="en-GB"/>
               <a:t>Click to edit Master text styles</a:t>
             </a:r>
           </a:p>
           <a:p>
             <a:pPr lvl="1"/>
             <a:r>
-              <a:rPr lang="en-GB" smtClean="0"/>
+              <a:rPr lang="en-GB"/>
               <a:t>Second level</a:t>
             </a:r>
           </a:p>
           <a:p>
             <a:pPr lvl="2"/>
             <a:r>
-              <a:rPr lang="en-GB" smtClean="0"/>
+              <a:rPr lang="en-GB"/>
               <a:t>Third level</a:t>
             </a:r>
           </a:p>
           <a:p>
             <a:pPr lvl="3"/>
             <a:r>
-              <a:rPr lang="en-GB" smtClean="0"/>
+              <a:rPr lang="en-GB"/>
               <a:t>Fourth level</a:t>
             </a:r>
           </a:p>
           <a:p>
             <a:pPr lvl="4"/>
             <a:r>
-              <a:rPr lang="en-GB" smtClean="0"/>
+              <a:rPr lang="en-GB"/>
               <a:t>Fifth level</a:t>
             </a:r>
             <a:endParaRPr lang="en-US"/>
@@ -2291,35 +2267,35 @@
           <a:p>
             <a:pPr lvl="0"/>
             <a:r>
-              <a:rPr lang="en-GB" smtClean="0"/>
+              <a:rPr lang="en-GB"/>
               <a:t>Click to edit Master text styles</a:t>
             </a:r>
           </a:p>
           <a:p>
             <a:pPr lvl="1"/>
             <a:r>
-              <a:rPr lang="en-GB" smtClean="0"/>
+              <a:rPr lang="en-GB"/>
               <a:t>Second level</a:t>
             </a:r>
           </a:p>
           <a:p>
             <a:pPr lvl="2"/>
             <a:r>
-              <a:rPr lang="en-GB" smtClean="0"/>
+              <a:rPr lang="en-GB"/>
               <a:t>Third level</a:t>
             </a:r>
           </a:p>
           <a:p>
             <a:pPr lvl="3"/>
             <a:r>
-              <a:rPr lang="en-GB" smtClean="0"/>
+              <a:rPr lang="en-GB"/>
               <a:t>Fourth level</a:t>
             </a:r>
           </a:p>
           <a:p>
             <a:pPr lvl="4"/>
             <a:r>
-              <a:rPr lang="en-GB" smtClean="0"/>
+              <a:rPr lang="en-GB"/>
               <a:t>Fifth level</a:t>
             </a:r>
             <a:endParaRPr lang="en-US"/>
@@ -2346,7 +2322,7 @@
           </a:lstStyle>
           <a:p>
             <a:r>
-              <a:rPr lang="en-GB" smtClean="0"/>
+              <a:rPr lang="en-GB"/>
               <a:t>30/10/2014</a:t>
             </a:r>
             <a:endParaRPr lang="en-US"/>
@@ -2373,10 +2349,9 @@
           </a:lstStyle>
           <a:p>
             <a:r>
-              <a:rPr lang="en-US" smtClean="0"/>
+              <a:rPr lang="en-US"/>
               <a:t>Chapter 10 Dependable Systems</a:t>
             </a:r>
-            <a:endParaRPr lang="en-US"/>
           </a:p>
         </p:txBody>
       </p:sp>
@@ -2412,16 +2387,9 @@
   <p:clrMapOvr>
     <a:masterClrMapping/>
   </p:clrMapOvr>
-  <p:transition xmlns:p14="http://schemas.microsoft.com/office/powerpoint/2010/main" spd="med">
+  <p:transition spd="med">
     <p:wipe dir="r"/>
   </p:transition>
-  <p:timing>
-    <p:tnLst>
-      <p:par>
-        <p:cTn xmlns:p14="http://schemas.microsoft.com/office/powerpoint/2010/main" id="1" dur="indefinite" restart="never" nodeType="tmRoot"/>
-      </p:par>
-    </p:tnLst>
-  </p:timing>
 </p:sldLayout>
 </file>
 
@@ -2462,7 +2430,7 @@
           </a:lstStyle>
           <a:p>
             <a:r>
-              <a:rPr lang="en-GB" smtClean="0"/>
+              <a:rPr lang="en-GB"/>
               <a:t>Click to edit Master title style</a:t>
             </a:r>
             <a:endParaRPr lang="en-US"/>
@@ -2531,7 +2499,7 @@
           <a:p>
             <a:pPr lvl="0"/>
             <a:r>
-              <a:rPr lang="en-GB" smtClean="0"/>
+              <a:rPr lang="en-GB"/>
               <a:t>Click to edit Master text styles</a:t>
             </a:r>
           </a:p>
@@ -2590,35 +2558,35 @@
           <a:p>
             <a:pPr lvl="0"/>
             <a:r>
-              <a:rPr lang="en-GB" smtClean="0"/>
+              <a:rPr lang="en-GB"/>
               <a:t>Click to edit Master text styles</a:t>
             </a:r>
           </a:p>
           <a:p>
             <a:pPr lvl="1"/>
             <a:r>
-              <a:rPr lang="en-GB" smtClean="0"/>
+              <a:rPr lang="en-GB"/>
               <a:t>Second level</a:t>
             </a:r>
           </a:p>
           <a:p>
             <a:pPr lvl="2"/>
             <a:r>
-              <a:rPr lang="en-GB" smtClean="0"/>
+              <a:rPr lang="en-GB"/>
               <a:t>Third level</a:t>
             </a:r>
           </a:p>
           <a:p>
             <a:pPr lvl="3"/>
             <a:r>
-              <a:rPr lang="en-GB" smtClean="0"/>
+              <a:rPr lang="en-GB"/>
               <a:t>Fourth level</a:t>
             </a:r>
           </a:p>
           <a:p>
             <a:pPr lvl="4"/>
             <a:r>
-              <a:rPr lang="en-GB" smtClean="0"/>
+              <a:rPr lang="en-GB"/>
               <a:t>Fifth level</a:t>
             </a:r>
             <a:endParaRPr lang="en-US"/>
@@ -2687,7 +2655,7 @@
           <a:p>
             <a:pPr lvl="0"/>
             <a:r>
-              <a:rPr lang="en-GB" smtClean="0"/>
+              <a:rPr lang="en-GB"/>
               <a:t>Click to edit Master text styles</a:t>
             </a:r>
           </a:p>
@@ -2746,35 +2714,35 @@
           <a:p>
             <a:pPr lvl="0"/>
             <a:r>
-              <a:rPr lang="en-GB" smtClean="0"/>
+              <a:rPr lang="en-GB"/>
               <a:t>Click to edit Master text styles</a:t>
             </a:r>
           </a:p>
           <a:p>
             <a:pPr lvl="1"/>
             <a:r>
-              <a:rPr lang="en-GB" smtClean="0"/>
+              <a:rPr lang="en-GB"/>
               <a:t>Second level</a:t>
             </a:r>
           </a:p>
           <a:p>
             <a:pPr lvl="2"/>
             <a:r>
-              <a:rPr lang="en-GB" smtClean="0"/>
+              <a:rPr lang="en-GB"/>
               <a:t>Third level</a:t>
             </a:r>
           </a:p>
           <a:p>
             <a:pPr lvl="3"/>
             <a:r>
-              <a:rPr lang="en-GB" smtClean="0"/>
+              <a:rPr lang="en-GB"/>
               <a:t>Fourth level</a:t>
             </a:r>
           </a:p>
           <a:p>
             <a:pPr lvl="4"/>
             <a:r>
-              <a:rPr lang="en-GB" smtClean="0"/>
+              <a:rPr lang="en-GB"/>
               <a:t>Fifth level</a:t>
             </a:r>
             <a:endParaRPr lang="en-US"/>
@@ -2801,7 +2769,7 @@
           </a:lstStyle>
           <a:p>
             <a:r>
-              <a:rPr lang="en-GB" smtClean="0"/>
+              <a:rPr lang="en-GB"/>
               <a:t>30/10/2014</a:t>
             </a:r>
             <a:endParaRPr lang="en-US"/>
@@ -2828,10 +2796,9 @@
           </a:lstStyle>
           <a:p>
             <a:r>
-              <a:rPr lang="en-US" smtClean="0"/>
+              <a:rPr lang="en-US"/>
               <a:t>Chapter 10 Dependable Systems</a:t>
             </a:r>
-            <a:endParaRPr lang="en-US"/>
           </a:p>
         </p:txBody>
       </p:sp>
@@ -2867,16 +2834,9 @@
   <p:clrMapOvr>
     <a:masterClrMapping/>
   </p:clrMapOvr>
-  <p:transition xmlns:p14="http://schemas.microsoft.com/office/powerpoint/2010/main" spd="med">
+  <p:transition spd="med">
     <p:wipe dir="r"/>
   </p:transition>
-  <p:timing>
-    <p:tnLst>
-      <p:par>
-        <p:cTn xmlns:p14="http://schemas.microsoft.com/office/powerpoint/2010/main" id="1" dur="indefinite" restart="never" nodeType="tmRoot"/>
-      </p:par>
-    </p:tnLst>
-  </p:timing>
 </p:sldLayout>
 </file>
 
@@ -2913,7 +2873,7 @@
           <a:lstStyle/>
           <a:p>
             <a:r>
-              <a:rPr lang="en-GB" smtClean="0"/>
+              <a:rPr lang="en-GB"/>
               <a:t>Click to edit Master title style</a:t>
             </a:r>
             <a:endParaRPr lang="en-US"/>
@@ -2940,7 +2900,7 @@
           </a:lstStyle>
           <a:p>
             <a:r>
-              <a:rPr lang="en-GB" smtClean="0"/>
+              <a:rPr lang="en-GB"/>
               <a:t>30/10/2014</a:t>
             </a:r>
             <a:endParaRPr lang="en-US"/>
@@ -2967,10 +2927,9 @@
           </a:lstStyle>
           <a:p>
             <a:r>
-              <a:rPr lang="en-US" smtClean="0"/>
+              <a:rPr lang="en-US"/>
               <a:t>Chapter 10 Dependable Systems</a:t>
             </a:r>
-            <a:endParaRPr lang="en-US"/>
           </a:p>
         </p:txBody>
       </p:sp>
@@ -3006,16 +2965,9 @@
   <p:clrMapOvr>
     <a:masterClrMapping/>
   </p:clrMapOvr>
-  <p:transition xmlns:p14="http://schemas.microsoft.com/office/powerpoint/2010/main" spd="med">
+  <p:transition spd="med">
     <p:wipe dir="r"/>
   </p:transition>
-  <p:timing>
-    <p:tnLst>
-      <p:par>
-        <p:cTn xmlns:p14="http://schemas.microsoft.com/office/powerpoint/2010/main" id="1" dur="indefinite" restart="never" nodeType="tmRoot"/>
-      </p:par>
-    </p:tnLst>
-  </p:timing>
 </p:sldLayout>
 </file>
 
@@ -3056,7 +3008,7 @@
           </a:lstStyle>
           <a:p>
             <a:r>
-              <a:rPr lang="en-GB" smtClean="0"/>
+              <a:rPr lang="en-GB"/>
               <a:t>30/10/2014</a:t>
             </a:r>
             <a:endParaRPr lang="en-US"/>
@@ -3083,10 +3035,9 @@
           </a:lstStyle>
           <a:p>
             <a:r>
-              <a:rPr lang="en-US" smtClean="0"/>
+              <a:rPr lang="en-US"/>
               <a:t>Chapter 10 Dependable Systems</a:t>
             </a:r>
-            <a:endParaRPr lang="en-US"/>
           </a:p>
         </p:txBody>
       </p:sp>
@@ -3122,16 +3073,9 @@
   <p:clrMapOvr>
     <a:masterClrMapping/>
   </p:clrMapOvr>
-  <p:transition xmlns:p14="http://schemas.microsoft.com/office/powerpoint/2010/main" spd="med">
+  <p:transition spd="med">
     <p:wipe dir="r"/>
   </p:transition>
-  <p:timing>
-    <p:tnLst>
-      <p:par>
-        <p:cTn xmlns:p14="http://schemas.microsoft.com/office/powerpoint/2010/main" id="1" dur="indefinite" restart="never" nodeType="tmRoot"/>
-      </p:par>
-    </p:tnLst>
-  </p:timing>
 </p:sldLayout>
 </file>
 
@@ -3177,7 +3121,7 @@
           </a:lstStyle>
           <a:p>
             <a:r>
-              <a:rPr lang="en-GB" smtClean="0"/>
+              <a:rPr lang="en-GB"/>
               <a:t>Click to edit Master title style</a:t>
             </a:r>
             <a:endParaRPr lang="en-US"/>
@@ -3237,35 +3181,35 @@
           <a:p>
             <a:pPr lvl="0"/>
             <a:r>
-              <a:rPr lang="en-GB" smtClean="0"/>
+              <a:rPr lang="en-GB"/>
               <a:t>Click to edit Master text styles</a:t>
             </a:r>
           </a:p>
           <a:p>
             <a:pPr lvl="1"/>
             <a:r>
-              <a:rPr lang="en-GB" smtClean="0"/>
+              <a:rPr lang="en-GB"/>
               <a:t>Second level</a:t>
             </a:r>
           </a:p>
           <a:p>
             <a:pPr lvl="2"/>
             <a:r>
-              <a:rPr lang="en-GB" smtClean="0"/>
+              <a:rPr lang="en-GB"/>
               <a:t>Third level</a:t>
             </a:r>
           </a:p>
           <a:p>
             <a:pPr lvl="3"/>
             <a:r>
-              <a:rPr lang="en-GB" smtClean="0"/>
+              <a:rPr lang="en-GB"/>
               <a:t>Fourth level</a:t>
             </a:r>
           </a:p>
           <a:p>
             <a:pPr lvl="4"/>
             <a:r>
-              <a:rPr lang="en-GB" smtClean="0"/>
+              <a:rPr lang="en-GB"/>
               <a:t>Fifth level</a:t>
             </a:r>
             <a:endParaRPr lang="en-US"/>
@@ -3334,7 +3278,7 @@
           <a:p>
             <a:pPr lvl="0"/>
             <a:r>
-              <a:rPr lang="en-GB" smtClean="0"/>
+              <a:rPr lang="en-GB"/>
               <a:t>Click to edit Master text styles</a:t>
             </a:r>
           </a:p>
@@ -3360,7 +3304,7 @@
           </a:lstStyle>
           <a:p>
             <a:r>
-              <a:rPr lang="en-GB" smtClean="0"/>
+              <a:rPr lang="en-GB"/>
               <a:t>30/10/2014</a:t>
             </a:r>
             <a:endParaRPr lang="en-US"/>
@@ -3387,10 +3331,9 @@
           </a:lstStyle>
           <a:p>
             <a:r>
-              <a:rPr lang="en-US" smtClean="0"/>
+              <a:rPr lang="en-US"/>
               <a:t>Chapter 10 Dependable Systems</a:t>
             </a:r>
-            <a:endParaRPr lang="en-US"/>
           </a:p>
         </p:txBody>
       </p:sp>
@@ -3426,16 +3369,9 @@
   <p:clrMapOvr>
     <a:masterClrMapping/>
   </p:clrMapOvr>
-  <p:transition xmlns:p14="http://schemas.microsoft.com/office/powerpoint/2010/main" spd="med">
+  <p:transition spd="med">
     <p:wipe dir="r"/>
   </p:transition>
-  <p:timing>
-    <p:tnLst>
-      <p:par>
-        <p:cTn xmlns:p14="http://schemas.microsoft.com/office/powerpoint/2010/main" id="1" dur="indefinite" restart="never" nodeType="tmRoot"/>
-      </p:par>
-    </p:tnLst>
-  </p:timing>
 </p:sldLayout>
 </file>
 
@@ -3481,7 +3417,7 @@
           </a:lstStyle>
           <a:p>
             <a:r>
-              <a:rPr lang="en-GB" smtClean="0"/>
+              <a:rPr lang="en-GB"/>
               <a:t>Click to edit Master title style</a:t>
             </a:r>
             <a:endParaRPr lang="en-US"/>
@@ -3550,7 +3486,7 @@
           <a:p>
             <a:pPr lvl="0"/>
             <a:r>
-              <a:rPr lang="en-GB" noProof="0" smtClean="0"/>
+              <a:rPr lang="en-GB" noProof="0"/>
               <a:t>Drag picture to placeholder or click icon to add</a:t>
             </a:r>
             <a:endParaRPr lang="en-US" noProof="0"/>
@@ -3619,7 +3555,7 @@
           <a:p>
             <a:pPr lvl="0"/>
             <a:r>
-              <a:rPr lang="en-GB" smtClean="0"/>
+              <a:rPr lang="en-GB"/>
               <a:t>Click to edit Master text styles</a:t>
             </a:r>
           </a:p>
@@ -3645,7 +3581,7 @@
           </a:lstStyle>
           <a:p>
             <a:r>
-              <a:rPr lang="en-GB" smtClean="0"/>
+              <a:rPr lang="en-GB"/>
               <a:t>30/10/2014</a:t>
             </a:r>
             <a:endParaRPr lang="en-US"/>
@@ -3672,10 +3608,9 @@
           </a:lstStyle>
           <a:p>
             <a:r>
-              <a:rPr lang="en-US" smtClean="0"/>
+              <a:rPr lang="en-US"/>
               <a:t>Chapter 10 Dependable Systems</a:t>
             </a:r>
-            <a:endParaRPr lang="en-US"/>
           </a:p>
         </p:txBody>
       </p:sp>
@@ -3711,16 +3646,9 @@
   <p:clrMapOvr>
     <a:masterClrMapping/>
   </p:clrMapOvr>
-  <p:transition xmlns:p14="http://schemas.microsoft.com/office/powerpoint/2010/main" spd="med">
+  <p:transition spd="med">
     <p:wipe dir="r"/>
   </p:transition>
-  <p:timing>
-    <p:tnLst>
-      <p:par>
-        <p:cTn xmlns:p14="http://schemas.microsoft.com/office/powerpoint/2010/main" id="1" dur="indefinite" restart="never" nodeType="tmRoot"/>
-      </p:par>
-    </p:tnLst>
-  </p:timing>
 </p:sldLayout>
 </file>
 
@@ -3782,7 +3710,7 @@
           <a:p>
             <a:pPr lvl="0"/>
             <a:r>
-              <a:rPr lang="en-GB" smtClean="0"/>
+              <a:rPr lang="en-GB"/>
               <a:t>Click to edit Master title style</a:t>
             </a:r>
             <a:endParaRPr lang="en-US" dirty="0"/>
@@ -3832,7 +3760,7 @@
           </a:lstStyle>
           <a:p>
             <a:r>
-              <a:rPr lang="en-GB" smtClean="0"/>
+              <a:rPr lang="en-GB"/>
               <a:t>30/10/2014</a:t>
             </a:r>
             <a:endParaRPr lang="en-US"/>
@@ -3882,10 +3810,9 @@
           </a:lstStyle>
           <a:p>
             <a:r>
-              <a:rPr lang="en-US" smtClean="0"/>
+              <a:rPr lang="en-US"/>
               <a:t>Chapter 10 Dependable Systems</a:t>
             </a:r>
-            <a:endParaRPr lang="en-US"/>
           </a:p>
         </p:txBody>
       </p:sp>
@@ -4061,16 +3988,9 @@
     <p:sldLayoutId id="2147483682" r:id="rId10"/>
     <p:sldLayoutId id="2147483683" r:id="rId11"/>
   </p:sldLayoutIdLst>
-  <p:transition xmlns:p14="http://schemas.microsoft.com/office/powerpoint/2010/main" spd="med">
+  <p:transition spd="med">
     <p:wipe dir="r"/>
   </p:transition>
-  <p:timing>
-    <p:tnLst>
-      <p:par>
-        <p:cTn xmlns:p14="http://schemas.microsoft.com/office/powerpoint/2010/main" id="1" dur="indefinite" restart="never" nodeType="tmRoot"/>
-      </p:par>
-    </p:tnLst>
-  </p:timing>
   <p:hf hdr="0"/>
   <p:txStyles>
     <p:titleStyle>
@@ -4502,10 +4422,9 @@
           <a:lstStyle/>
           <a:p>
             <a:r>
-              <a:rPr lang="en-US" dirty="0" smtClean="0"/>
+              <a:rPr lang="en-US" dirty="0"/>
               <a:t>Chapter 10 – Dependable systems</a:t>
             </a:r>
-            <a:endParaRPr lang="en-US" dirty="0"/>
           </a:p>
         </p:txBody>
       </p:sp>
@@ -4544,7 +4463,7 @@
           <a:lstStyle/>
           <a:p>
             <a:r>
-              <a:rPr lang="en-GB" smtClean="0"/>
+              <a:rPr lang="en-GB"/>
               <a:t>30/10/2014</a:t>
             </a:r>
             <a:endParaRPr lang="en-US"/>
@@ -4567,10 +4486,9 @@
           <a:lstStyle/>
           <a:p>
             <a:r>
-              <a:rPr lang="en-US" smtClean="0"/>
+              <a:rPr lang="en-US"/>
               <a:t>Chapter 10 Dependable Systems</a:t>
             </a:r>
-            <a:endParaRPr lang="en-US"/>
           </a:p>
         </p:txBody>
       </p:sp>
@@ -4607,7 +4525,7 @@
   <p:clrMapOvr>
     <a:masterClrMapping/>
   </p:clrMapOvr>
-  <p:transition xmlns:p14="http://schemas.microsoft.com/office/powerpoint/2010/main" spd="med">
+  <p:transition spd="med">
     <p:wipe dir="r"/>
   </p:transition>
 </p:sld>
@@ -4718,12 +4636,8 @@
               </a:lnSpc>
             </a:pPr>
             <a:r>
-              <a:rPr lang="en-US" sz="2400" dirty="0" smtClean="0"/>
-              <a:t>Error </a:t>
-            </a:r>
-            <a:r>
               <a:rPr lang="en-US" sz="2400" dirty="0"/>
-              <a:t>tolerance</a:t>
+              <a:t>Error tolerance</a:t>
             </a:r>
           </a:p>
           <a:p>
@@ -4779,10 +4693,9 @@
           <a:lstStyle/>
           <a:p>
             <a:r>
-              <a:rPr lang="en-US" smtClean="0"/>
+              <a:rPr lang="en-US"/>
               <a:t>Chapter 10 Dependable Systems</a:t>
             </a:r>
-            <a:endParaRPr lang="en-US"/>
           </a:p>
         </p:txBody>
       </p:sp>
@@ -4802,7 +4715,7 @@
           <a:lstStyle/>
           <a:p>
             <a:r>
-              <a:rPr lang="en-GB" smtClean="0"/>
+              <a:rPr lang="en-GB"/>
               <a:t>30/10/2014</a:t>
             </a:r>
             <a:endParaRPr lang="en-US"/>
@@ -4819,7 +4732,7 @@
   <p:clrMapOvr>
     <a:masterClrMapping/>
   </p:clrMapOvr>
-  <p:transition xmlns:p14="http://schemas.microsoft.com/office/powerpoint/2010/main" spd="med">
+  <p:transition spd="med">
     <p:wipe dir="r"/>
   </p:transition>
 </p:sld>
@@ -4858,10 +4771,9 @@
           <a:lstStyle/>
           <a:p>
             <a:r>
-              <a:rPr lang="en-US" dirty="0" smtClean="0"/>
+              <a:rPr lang="en-US" dirty="0"/>
               <a:t>Dependability attribute dependencies</a:t>
             </a:r>
-            <a:endParaRPr lang="en-US" dirty="0"/>
           </a:p>
         </p:txBody>
       </p:sp>
@@ -4881,28 +4793,27 @@
           <a:lstStyle/>
           <a:p>
             <a:r>
-              <a:rPr lang="en-US" dirty="0" smtClean="0"/>
+              <a:rPr lang="en-US" dirty="0"/>
               <a:t>Safe system operation depends on the system being available and operating reliably.</a:t>
             </a:r>
           </a:p>
           <a:p>
             <a:r>
-              <a:rPr lang="en-US" dirty="0" smtClean="0"/>
+              <a:rPr lang="en-US" dirty="0"/>
               <a:t>A system may be unreliable because its data has been corrupted by an external attack.</a:t>
             </a:r>
           </a:p>
           <a:p>
             <a:r>
-              <a:rPr lang="en-US" dirty="0" smtClean="0"/>
+              <a:rPr lang="en-US" dirty="0"/>
               <a:t>Denial of service attacks on a system are intended to make it unavailable.</a:t>
             </a:r>
           </a:p>
           <a:p>
             <a:r>
-              <a:rPr lang="en-US" dirty="0" smtClean="0"/>
+              <a:rPr lang="en-US" dirty="0"/>
               <a:t>If a system is infected with a virus, you cannot be confident in its reliability or safety.</a:t>
             </a:r>
-            <a:endParaRPr lang="en-US" dirty="0"/>
           </a:p>
         </p:txBody>
       </p:sp>
@@ -4922,10 +4833,9 @@
           <a:lstStyle/>
           <a:p>
             <a:r>
-              <a:rPr lang="en-US" smtClean="0"/>
+              <a:rPr lang="en-US"/>
               <a:t>Chapter 10 Dependable Systems</a:t>
             </a:r>
-            <a:endParaRPr lang="en-US"/>
           </a:p>
         </p:txBody>
       </p:sp>
@@ -4969,7 +4879,7 @@
           <a:lstStyle/>
           <a:p>
             <a:r>
-              <a:rPr lang="en-GB" smtClean="0"/>
+              <a:rPr lang="en-GB"/>
               <a:t>30/10/2014</a:t>
             </a:r>
             <a:endParaRPr lang="en-US"/>
@@ -4986,7 +4896,7 @@
   <p:clrMapOvr>
     <a:masterClrMapping/>
   </p:clrMapOvr>
-  <p:transition xmlns:p14="http://schemas.microsoft.com/office/powerpoint/2010/main" spd="med">
+  <p:transition spd="med">
     <p:wipe dir="r"/>
   </p:transition>
 </p:sld>
@@ -5025,10 +4935,9 @@
           <a:lstStyle/>
           <a:p>
             <a:r>
-              <a:rPr lang="en-US" dirty="0" smtClean="0"/>
+              <a:rPr lang="en-US" dirty="0"/>
               <a:t>Dependability achievement</a:t>
             </a:r>
-            <a:endParaRPr lang="en-US" dirty="0"/>
           </a:p>
         </p:txBody>
       </p:sp>
@@ -5048,33 +4957,25 @@
           <a:lstStyle/>
           <a:p>
             <a:r>
-              <a:rPr lang="en-US" dirty="0" smtClean="0"/>
+              <a:rPr lang="en-US" dirty="0"/>
               <a:t>Avoid the introduction of accidental errors when developing the system.</a:t>
             </a:r>
           </a:p>
           <a:p>
             <a:r>
-              <a:rPr lang="en-US" dirty="0" smtClean="0"/>
+              <a:rPr lang="en-US" dirty="0"/>
               <a:t>Design V &amp; V processes that are effective in discovering residual errors in the system.</a:t>
             </a:r>
           </a:p>
           <a:p>
             <a:r>
-              <a:rPr lang="en-US" dirty="0" smtClean="0"/>
-              <a:t>Design systems to be fault</a:t>
-            </a:r>
-            <a:r>
-              <a:rPr lang="en-US" dirty="0"/>
-              <a:t> </a:t>
-            </a:r>
-            <a:r>
-              <a:rPr lang="en-US" dirty="0" smtClean="0"/>
-              <a:t>tolerant so that they can continue in operation when faults occur</a:t>
-            </a:r>
-          </a:p>
-          <a:p>
-            <a:r>
-              <a:rPr lang="en-US" dirty="0" smtClean="0"/>
+              <a:rPr lang="en-US" dirty="0"/>
+              <a:t>Design systems to be fault tolerant so that they can continue in operation when faults occur</a:t>
+            </a:r>
+          </a:p>
+          <a:p>
+            <a:r>
+              <a:rPr lang="en-US" dirty="0"/>
               <a:t>Design protection mechanisms that guard against external attacks.</a:t>
             </a:r>
           </a:p>
@@ -5096,10 +4997,9 @@
           <a:lstStyle/>
           <a:p>
             <a:r>
-              <a:rPr lang="en-US" smtClean="0"/>
+              <a:rPr lang="en-US"/>
               <a:t>Chapter 10 Dependable Systems</a:t>
             </a:r>
-            <a:endParaRPr lang="en-US"/>
           </a:p>
         </p:txBody>
       </p:sp>
@@ -5143,7 +5043,7 @@
           <a:lstStyle/>
           <a:p>
             <a:r>
-              <a:rPr lang="en-GB" smtClean="0"/>
+              <a:rPr lang="en-GB"/>
               <a:t>30/10/2014</a:t>
             </a:r>
             <a:endParaRPr lang="en-US"/>
@@ -5160,7 +5060,7 @@
   <p:clrMapOvr>
     <a:masterClrMapping/>
   </p:clrMapOvr>
-  <p:transition xmlns:p14="http://schemas.microsoft.com/office/powerpoint/2010/main" spd="med">
+  <p:transition spd="med">
     <p:wipe dir="r"/>
   </p:transition>
 </p:sld>
@@ -5199,65 +5099,59 @@
           <a:lstStyle/>
           <a:p>
             <a:r>
-              <a:rPr lang="en-US" dirty="0" smtClean="0"/>
+              <a:rPr lang="en-US" dirty="0"/>
               <a:t>Dependability achievement</a:t>
             </a:r>
+          </a:p>
+        </p:txBody>
+      </p:sp>
+      <p:sp>
+        <p:nvSpPr>
+          <p:cNvPr id="3" name="Content Placeholder 2"/>
+          <p:cNvSpPr>
+            <a:spLocks noGrp="1"/>
+          </p:cNvSpPr>
+          <p:nvPr>
+            <p:ph idx="1"/>
+          </p:nvPr>
+        </p:nvSpPr>
+        <p:spPr/>
+        <p:txBody>
+          <a:bodyPr/>
+          <a:lstStyle/>
+          <a:p>
+            <a:r>
+              <a:rPr lang="en-US" dirty="0"/>
+              <a:t>Configure the system correctly for its operating environment.</a:t>
+            </a:r>
+          </a:p>
+          <a:p>
+            <a:r>
+              <a:rPr lang="en-US" dirty="0"/>
+              <a:t>Include system capabilities to </a:t>
+            </a:r>
+            <a:r>
+              <a:rPr lang="en-US" dirty="0" err="1"/>
+              <a:t>recognise</a:t>
+            </a:r>
+            <a:r>
+              <a:rPr lang="en-US" dirty="0"/>
+              <a:t> and resist cyberattacks.</a:t>
+            </a:r>
+          </a:p>
+          <a:p>
+            <a:r>
+              <a:rPr lang="en-US" dirty="0"/>
+              <a:t>Include recovery mechanisms to help restore normal system service after a failure.</a:t>
+            </a:r>
+          </a:p>
+          <a:p>
             <a:endParaRPr lang="en-US" dirty="0"/>
           </a:p>
         </p:txBody>
       </p:sp>
       <p:sp>
         <p:nvSpPr>
-          <p:cNvPr id="3" name="Content Placeholder 2"/>
-          <p:cNvSpPr>
-            <a:spLocks noGrp="1"/>
-          </p:cNvSpPr>
-          <p:nvPr>
-            <p:ph idx="1"/>
-          </p:nvPr>
-        </p:nvSpPr>
-        <p:spPr/>
-        <p:txBody>
-          <a:bodyPr/>
-          <a:lstStyle/>
-          <a:p>
-            <a:r>
-              <a:rPr lang="en-US" dirty="0"/>
-              <a:t>Configure the system correctly for its operating environment</a:t>
-            </a:r>
-            <a:r>
-              <a:rPr lang="en-US" dirty="0" smtClean="0"/>
-              <a:t>.</a:t>
-            </a:r>
-          </a:p>
-          <a:p>
-            <a:r>
-              <a:rPr lang="en-US" dirty="0" smtClean="0"/>
-              <a:t>Include system capabilities to </a:t>
-            </a:r>
-            <a:r>
-              <a:rPr lang="en-US" dirty="0" err="1" smtClean="0"/>
-              <a:t>recognise</a:t>
-            </a:r>
-            <a:r>
-              <a:rPr lang="en-US" dirty="0" smtClean="0"/>
-              <a:t> and resist cyberattacks.</a:t>
-            </a:r>
-            <a:endParaRPr lang="en-US" dirty="0"/>
-          </a:p>
-          <a:p>
-            <a:r>
-              <a:rPr lang="en-US" dirty="0"/>
-              <a:t>Include recovery mechanisms to help restore normal system service after a failure.</a:t>
-            </a:r>
-          </a:p>
-          <a:p>
-            <a:endParaRPr lang="en-US" dirty="0"/>
-          </a:p>
-        </p:txBody>
-      </p:sp>
-      <p:sp>
-        <p:nvSpPr>
           <p:cNvPr id="4" name="Date Placeholder 3"/>
           <p:cNvSpPr>
             <a:spLocks noGrp="1"/>
@@ -5272,7 +5166,7 @@
           <a:lstStyle/>
           <a:p>
             <a:r>
-              <a:rPr lang="en-GB" smtClean="0"/>
+              <a:rPr lang="en-GB"/>
               <a:t>30/10/2014</a:t>
             </a:r>
             <a:endParaRPr lang="en-US"/>
@@ -5295,10 +5189,9 @@
           <a:lstStyle/>
           <a:p>
             <a:r>
-              <a:rPr lang="en-US" smtClean="0"/>
+              <a:rPr lang="en-US"/>
               <a:t>Chapter 10 Dependable Systems</a:t>
             </a:r>
-            <a:endParaRPr lang="en-US"/>
           </a:p>
         </p:txBody>
       </p:sp>
@@ -5335,7 +5228,7 @@
   <p:clrMapOvr>
     <a:masterClrMapping/>
   </p:clrMapOvr>
-  <p:transition xmlns:p14="http://schemas.microsoft.com/office/powerpoint/2010/main" spd="med">
+  <p:transition spd="med">
     <p:wipe dir="r"/>
   </p:transition>
 </p:sld>
@@ -5397,11 +5290,7 @@
           <a:p>
             <a:r>
               <a:rPr lang="en-GB" sz="2400" dirty="0"/>
-              <a:t>Dependability costs tend to increase exponentially as increasing levels of dependability are </a:t>
-            </a:r>
-            <a:r>
-              <a:rPr lang="en-GB" sz="2400" dirty="0" smtClean="0"/>
-              <a:t>required.</a:t>
+              <a:t>Dependability costs tend to increase exponentially as increasing levels of dependability are required.</a:t>
             </a:r>
           </a:p>
           <a:p>
@@ -5414,32 +5303,15 @@
             <a:pPr lvl="1"/>
             <a:r>
               <a:rPr lang="en-GB" sz="2000" dirty="0"/>
-              <a:t>The use of more expensive development techniques and hardware that are required to achieve the higher levels of </a:t>
-            </a:r>
-            <a:r>
-              <a:rPr lang="en-GB" sz="2000" dirty="0" smtClean="0"/>
-              <a:t>dependability.</a:t>
+              <a:t>The use of more expensive development techniques and hardware that are required to achieve the higher levels of dependability.</a:t>
             </a:r>
           </a:p>
           <a:p>
             <a:pPr lvl="1"/>
             <a:r>
               <a:rPr lang="en-GB" sz="2000" dirty="0"/>
-              <a:t>The increased testing and system validation that is required to convince the system client</a:t>
-            </a:r>
-            <a:r>
-              <a:rPr lang="en-GB" sz="2000" dirty="0" smtClean="0"/>
-              <a:t> and regulators that </a:t>
-            </a:r>
-            <a:r>
-              <a:rPr lang="en-GB" sz="2000" dirty="0"/>
-              <a:t>the required levels of dependability have been </a:t>
-            </a:r>
-            <a:r>
-              <a:rPr lang="en-GB" sz="2000" dirty="0" smtClean="0"/>
-              <a:t>achieved.</a:t>
-            </a:r>
-            <a:endParaRPr lang="en-GB" sz="2000" dirty="0"/>
+              <a:t>The increased testing and system validation that is required to convince the system client and regulators that the required levels of dependability have been achieved.</a:t>
+            </a:r>
           </a:p>
         </p:txBody>
       </p:sp>
@@ -5483,10 +5355,9 @@
           <a:lstStyle/>
           <a:p>
             <a:r>
-              <a:rPr lang="en-US" smtClean="0"/>
+              <a:rPr lang="en-US"/>
               <a:t>Chapter 10 Dependable Systems</a:t>
             </a:r>
-            <a:endParaRPr lang="en-US"/>
           </a:p>
         </p:txBody>
       </p:sp>
@@ -5506,7 +5377,7 @@
           <a:lstStyle/>
           <a:p>
             <a:r>
-              <a:rPr lang="en-GB" smtClean="0"/>
+              <a:rPr lang="en-GB"/>
               <a:t>30/10/2014</a:t>
             </a:r>
             <a:endParaRPr lang="en-US"/>
@@ -5523,7 +5394,7 @@
   <p:clrMapOvr>
     <a:masterClrMapping/>
   </p:clrMapOvr>
-  <p:transition xmlns:p14="http://schemas.microsoft.com/office/powerpoint/2010/main" spd="med">
+  <p:transition spd="med">
     <p:wipe dir="r"/>
   </p:transition>
 </p:sld>
@@ -5562,10 +5433,9 @@
           <a:lstStyle/>
           <a:p>
             <a:r>
-              <a:rPr lang="en-US" dirty="0" smtClean="0"/>
+              <a:rPr lang="en-US" dirty="0"/>
               <a:t>Cost/dependability curve</a:t>
             </a:r>
-            <a:endParaRPr lang="en-US" dirty="0"/>
           </a:p>
         </p:txBody>
       </p:sp>
@@ -5615,7 +5485,7 @@
           <a:lstStyle/>
           <a:p>
             <a:r>
-              <a:rPr lang="en-GB" smtClean="0"/>
+              <a:rPr lang="en-GB"/>
               <a:t>30/10/2014</a:t>
             </a:r>
             <a:endParaRPr lang="en-US"/>
@@ -5638,10 +5508,9 @@
           <a:lstStyle/>
           <a:p>
             <a:r>
-              <a:rPr lang="en-US" smtClean="0"/>
+              <a:rPr lang="en-US"/>
               <a:t>Chapter 10 Dependable Systems</a:t>
             </a:r>
-            <a:endParaRPr lang="en-US"/>
           </a:p>
         </p:txBody>
       </p:sp>
@@ -5678,7 +5547,7 @@
   <p:clrMapOvr>
     <a:masterClrMapping/>
   </p:clrMapOvr>
-  <p:transition xmlns:p14="http://schemas.microsoft.com/office/powerpoint/2010/main" spd="med">
+  <p:transition spd="med">
     <p:wipe dir="r"/>
   </p:transition>
 </p:sld>
@@ -5818,10 +5687,9 @@
           <a:lstStyle/>
           <a:p>
             <a:r>
-              <a:rPr lang="en-US" smtClean="0"/>
+              <a:rPr lang="en-US"/>
               <a:t>Chapter 10 Dependable Systems</a:t>
             </a:r>
-            <a:endParaRPr lang="en-US"/>
           </a:p>
         </p:txBody>
       </p:sp>
@@ -5841,7 +5709,7 @@
           <a:lstStyle/>
           <a:p>
             <a:r>
-              <a:rPr lang="en-GB" smtClean="0"/>
+              <a:rPr lang="en-GB"/>
               <a:t>30/10/2014</a:t>
             </a:r>
             <a:endParaRPr lang="en-US"/>
@@ -5858,7 +5726,7 @@
   <p:clrMapOvr>
     <a:masterClrMapping/>
   </p:clrMapOvr>
-  <p:transition xmlns:p14="http://schemas.microsoft.com/office/powerpoint/2010/main"/>
+  <p:transition/>
 </p:sld>
 </file>
 
@@ -5901,10 +5769,9 @@
           <a:p>
             <a:pPr algn="ctr"/>
             <a:r>
-              <a:rPr lang="en-US" dirty="0" smtClean="0"/>
+              <a:rPr lang="en-US" dirty="0"/>
               <a:t>Sociotechnical systems</a:t>
             </a:r>
-            <a:endParaRPr lang="en-US" dirty="0"/>
           </a:p>
         </p:txBody>
       </p:sp>
@@ -5924,7 +5791,7 @@
           <a:lstStyle/>
           <a:p>
             <a:r>
-              <a:rPr lang="en-GB" smtClean="0"/>
+              <a:rPr lang="en-GB"/>
               <a:t>30/10/2014</a:t>
             </a:r>
             <a:endParaRPr lang="en-US"/>
@@ -5947,10 +5814,9 @@
           <a:lstStyle/>
           <a:p>
             <a:r>
-              <a:rPr lang="en-US" smtClean="0"/>
+              <a:rPr lang="en-US"/>
               <a:t>Chapter 10 Dependable Systems</a:t>
             </a:r>
-            <a:endParaRPr lang="en-US"/>
           </a:p>
         </p:txBody>
       </p:sp>
@@ -5987,7 +5853,7 @@
   <p:clrMapOvr>
     <a:masterClrMapping/>
   </p:clrMapOvr>
-  <p:transition xmlns:p14="http://schemas.microsoft.com/office/powerpoint/2010/main" spd="med">
+  <p:transition spd="med">
     <p:wipe dir="r"/>
   </p:transition>
 </p:sld>
@@ -6026,10 +5892,9 @@
           <a:lstStyle/>
           <a:p>
             <a:r>
-              <a:rPr lang="en-US" dirty="0" smtClean="0"/>
+              <a:rPr lang="en-US" dirty="0"/>
               <a:t>Systems and software</a:t>
             </a:r>
-            <a:endParaRPr lang="en-US" dirty="0"/>
           </a:p>
         </p:txBody>
       </p:sp>
@@ -6049,36 +5914,35 @@
           <a:lstStyle/>
           <a:p>
             <a:r>
-              <a:rPr lang="en-US" dirty="0" smtClean="0"/>
+              <a:rPr lang="en-US" dirty="0"/>
               <a:t>Software engineering is not an isolated activity but is part of a broader systems engineering process.</a:t>
             </a:r>
           </a:p>
           <a:p>
             <a:r>
-              <a:rPr lang="en-US" dirty="0" smtClean="0"/>
+              <a:rPr lang="en-US" dirty="0"/>
               <a:t>Software systems are therefore not isolated systems but are essential components of broader systems that have a human, social or organizational purpose.</a:t>
             </a:r>
           </a:p>
           <a:p>
             <a:r>
-              <a:rPr lang="en-US" dirty="0" smtClean="0"/>
+              <a:rPr lang="en-US" dirty="0"/>
               <a:t>Example</a:t>
             </a:r>
           </a:p>
           <a:p>
             <a:pPr lvl="1"/>
             <a:r>
-              <a:rPr lang="en-US" dirty="0" smtClean="0"/>
+              <a:rPr lang="en-US" dirty="0"/>
               <a:t>The wilderness weather system is part of broader weather recording and forecasting systems</a:t>
             </a:r>
           </a:p>
           <a:p>
             <a:pPr lvl="1"/>
             <a:r>
-              <a:rPr lang="en-US" dirty="0" smtClean="0"/>
+              <a:rPr lang="en-US" dirty="0"/>
               <a:t>These include hardware and software, forecasting processes, system users, the organizations that depend on weather forecasts, etc.</a:t>
             </a:r>
-            <a:endParaRPr lang="en-US" dirty="0"/>
           </a:p>
         </p:txBody>
       </p:sp>
@@ -6098,10 +5962,9 @@
           <a:lstStyle/>
           <a:p>
             <a:r>
-              <a:rPr lang="en-US" smtClean="0"/>
+              <a:rPr lang="en-US"/>
               <a:t>Chapter 10 Dependable Systems</a:t>
             </a:r>
-            <a:endParaRPr lang="en-US"/>
           </a:p>
         </p:txBody>
       </p:sp>
@@ -6145,7 +6008,7 @@
           <a:lstStyle/>
           <a:p>
             <a:r>
-              <a:rPr lang="en-GB" smtClean="0"/>
+              <a:rPr lang="en-GB"/>
               <a:t>30/10/2014</a:t>
             </a:r>
             <a:endParaRPr lang="en-US"/>
@@ -6162,16 +6025,9 @@
   <p:clrMapOvr>
     <a:masterClrMapping/>
   </p:clrMapOvr>
-  <p:transition xmlns:p14="http://schemas.microsoft.com/office/powerpoint/2010/main" spd="med">
+  <p:transition spd="med">
     <p:wipe dir="r"/>
   </p:transition>
-  <p:timing>
-    <p:tnLst>
-      <p:par>
-        <p:cTn xmlns:p14="http://schemas.microsoft.com/office/powerpoint/2010/main" id="1" dur="indefinite" restart="never" nodeType="tmRoot"/>
-      </p:par>
-    </p:tnLst>
-  </p:timing>
 </p:sld>
 </file>
 
@@ -6208,10 +6064,9 @@
           <a:lstStyle/>
           <a:p>
             <a:r>
-              <a:rPr lang="en-US" dirty="0" smtClean="0"/>
+              <a:rPr lang="en-US" dirty="0"/>
               <a:t>The sociotechnical systems stack</a:t>
             </a:r>
-            <a:endParaRPr lang="en-US" dirty="0"/>
           </a:p>
         </p:txBody>
       </p:sp>
@@ -6261,7 +6116,7 @@
           <a:lstStyle/>
           <a:p>
             <a:r>
-              <a:rPr lang="en-GB" smtClean="0"/>
+              <a:rPr lang="en-GB"/>
               <a:t>30/10/2014</a:t>
             </a:r>
             <a:endParaRPr lang="en-US"/>
@@ -6284,10 +6139,9 @@
           <a:lstStyle/>
           <a:p>
             <a:r>
-              <a:rPr lang="en-US" smtClean="0"/>
+              <a:rPr lang="en-US"/>
               <a:t>Chapter 10 Dependable Systems</a:t>
             </a:r>
-            <a:endParaRPr lang="en-US"/>
           </a:p>
         </p:txBody>
       </p:sp>
@@ -6324,7 +6178,7 @@
   <p:clrMapOvr>
     <a:masterClrMapping/>
   </p:clrMapOvr>
-  <p:transition xmlns:p14="http://schemas.microsoft.com/office/powerpoint/2010/main" spd="med">
+  <p:transition spd="med">
     <p:wipe dir="r"/>
   </p:transition>
 </p:sld>
@@ -6363,10 +6217,9 @@
           <a:lstStyle/>
           <a:p>
             <a:r>
-              <a:rPr lang="en-US" dirty="0" smtClean="0"/>
+              <a:rPr lang="en-US" dirty="0"/>
               <a:t>Topics covered</a:t>
             </a:r>
-            <a:endParaRPr lang="en-US" dirty="0"/>
           </a:p>
         </p:txBody>
       </p:sp>
@@ -6386,34 +6239,33 @@
           <a:lstStyle/>
           <a:p>
             <a:r>
-              <a:rPr lang="en-US" dirty="0" smtClean="0"/>
+              <a:rPr lang="en-US" dirty="0"/>
               <a:t>Dependability properties</a:t>
             </a:r>
           </a:p>
           <a:p>
             <a:r>
-              <a:rPr lang="en-US" dirty="0" smtClean="0"/>
+              <a:rPr lang="en-US" dirty="0"/>
               <a:t>Sociotechnical systems</a:t>
             </a:r>
           </a:p>
           <a:p>
             <a:r>
-              <a:rPr lang="en-US" dirty="0" smtClean="0"/>
+              <a:rPr lang="en-US" dirty="0"/>
               <a:t>Redundancy and diversity</a:t>
             </a:r>
           </a:p>
           <a:p>
             <a:r>
-              <a:rPr lang="en-US" dirty="0" smtClean="0"/>
+              <a:rPr lang="en-US" dirty="0"/>
               <a:t>Dependable processes</a:t>
             </a:r>
           </a:p>
           <a:p>
             <a:r>
-              <a:rPr lang="en-US" dirty="0" smtClean="0"/>
+              <a:rPr lang="en-US" dirty="0"/>
               <a:t>Formal methods and dependability</a:t>
             </a:r>
-            <a:endParaRPr lang="en-US" dirty="0"/>
           </a:p>
         </p:txBody>
       </p:sp>
@@ -6433,7 +6285,7 @@
           <a:lstStyle/>
           <a:p>
             <a:r>
-              <a:rPr lang="en-GB" smtClean="0"/>
+              <a:rPr lang="en-GB"/>
               <a:t>30/10/2014</a:t>
             </a:r>
             <a:endParaRPr lang="en-US"/>
@@ -6456,10 +6308,9 @@
           <a:lstStyle/>
           <a:p>
             <a:r>
-              <a:rPr lang="en-US" smtClean="0"/>
+              <a:rPr lang="en-US"/>
               <a:t>Chapter 10 Dependable Systems</a:t>
             </a:r>
-            <a:endParaRPr lang="en-US"/>
           </a:p>
         </p:txBody>
       </p:sp>
@@ -6496,7 +6347,7 @@
   <p:clrMapOvr>
     <a:masterClrMapping/>
   </p:clrMapOvr>
-  <p:transition xmlns:p14="http://schemas.microsoft.com/office/powerpoint/2010/main" spd="med">
+  <p:transition spd="med">
     <p:wipe dir="r"/>
   </p:transition>
 </p:sld>
@@ -6535,10 +6386,9 @@
           <a:lstStyle/>
           <a:p>
             <a:r>
-              <a:rPr lang="en-US" dirty="0" smtClean="0"/>
+              <a:rPr lang="en-US" dirty="0"/>
               <a:t>Layers in the STS stack</a:t>
             </a:r>
-            <a:endParaRPr lang="en-US" dirty="0"/>
           </a:p>
         </p:txBody>
       </p:sp>
@@ -6558,53 +6408,53 @@
           <a:lstStyle/>
           <a:p>
             <a:r>
-              <a:rPr lang="en-US" dirty="0" smtClean="0"/>
+              <a:rPr lang="en-US" dirty="0"/>
               <a:t>Equipment</a:t>
             </a:r>
           </a:p>
           <a:p>
             <a:pPr lvl="1"/>
             <a:r>
-              <a:rPr lang="en-US" dirty="0" smtClean="0"/>
+              <a:rPr lang="en-US" dirty="0"/>
               <a:t>Hardware devices, some of which may be computers. Most devices will include an embedded system of some kind.</a:t>
             </a:r>
           </a:p>
           <a:p>
             <a:r>
-              <a:rPr lang="en-US" dirty="0" smtClean="0"/>
+              <a:rPr lang="en-US" dirty="0"/>
               <a:t>Operating system</a:t>
             </a:r>
           </a:p>
           <a:p>
             <a:pPr lvl="1"/>
             <a:r>
-              <a:rPr lang="en-US" dirty="0" smtClean="0"/>
+              <a:rPr lang="en-US" dirty="0"/>
               <a:t>Provides a set of common facilities for higher levels in the system.</a:t>
             </a:r>
           </a:p>
           <a:p>
             <a:r>
-              <a:rPr lang="en-US" dirty="0" smtClean="0"/>
+              <a:rPr lang="en-US" dirty="0"/>
               <a:t>Communications and data management</a:t>
             </a:r>
           </a:p>
           <a:p>
             <a:pPr lvl="1"/>
             <a:r>
-              <a:rPr lang="en-US" dirty="0" smtClean="0"/>
+              <a:rPr lang="en-US" dirty="0"/>
               <a:t>Middleware that provides access to remote systems and databases.</a:t>
             </a:r>
           </a:p>
           <a:p>
             <a:r>
-              <a:rPr lang="en-US" dirty="0" smtClean="0"/>
+              <a:rPr lang="en-US" dirty="0"/>
               <a:t>Application systems</a:t>
             </a:r>
           </a:p>
           <a:p>
             <a:pPr lvl="1"/>
             <a:r>
-              <a:rPr lang="en-US" dirty="0" smtClean="0"/>
+              <a:rPr lang="en-US" dirty="0"/>
               <a:t>Specific functionality to meet some organization requirements.</a:t>
             </a:r>
           </a:p>
@@ -6626,10 +6476,9 @@
           <a:lstStyle/>
           <a:p>
             <a:r>
-              <a:rPr lang="en-US" smtClean="0"/>
+              <a:rPr lang="en-US"/>
               <a:t>Chapter 10 Dependable Systems</a:t>
             </a:r>
-            <a:endParaRPr lang="en-US"/>
           </a:p>
         </p:txBody>
       </p:sp>
@@ -6673,7 +6522,7 @@
           <a:lstStyle/>
           <a:p>
             <a:r>
-              <a:rPr lang="en-GB" smtClean="0"/>
+              <a:rPr lang="en-GB"/>
               <a:t>30/10/2014</a:t>
             </a:r>
             <a:endParaRPr lang="en-US"/>
@@ -6690,16 +6539,9 @@
   <p:clrMapOvr>
     <a:masterClrMapping/>
   </p:clrMapOvr>
-  <p:transition xmlns:p14="http://schemas.microsoft.com/office/powerpoint/2010/main" spd="med">
+  <p:transition spd="med">
     <p:wipe dir="r"/>
   </p:transition>
-  <p:timing>
-    <p:tnLst>
-      <p:par>
-        <p:cTn xmlns:p14="http://schemas.microsoft.com/office/powerpoint/2010/main" id="1" dur="indefinite" restart="never" nodeType="tmRoot"/>
-      </p:par>
-    </p:tnLst>
-  </p:timing>
 </p:sld>
 </file>
 
@@ -6736,10 +6578,9 @@
           <a:lstStyle/>
           <a:p>
             <a:r>
-              <a:rPr lang="en-US" dirty="0" smtClean="0"/>
+              <a:rPr lang="en-US" dirty="0"/>
               <a:t>Layers in the STS stack</a:t>
             </a:r>
-            <a:endParaRPr lang="en-US" dirty="0"/>
           </a:p>
         </p:txBody>
       </p:sp>
@@ -6759,43 +6600,42 @@
           <a:lstStyle/>
           <a:p>
             <a:r>
-              <a:rPr lang="en-US" dirty="0" smtClean="0"/>
+              <a:rPr lang="en-US" dirty="0"/>
               <a:t>Business processes</a:t>
             </a:r>
           </a:p>
           <a:p>
             <a:pPr lvl="1"/>
             <a:r>
-              <a:rPr lang="en-US" dirty="0" smtClean="0"/>
+              <a:rPr lang="en-US" dirty="0"/>
               <a:t>A set of processes involving people and computer systems that support the activities of the business.</a:t>
             </a:r>
           </a:p>
           <a:p>
             <a:r>
-              <a:rPr lang="en-US" dirty="0" smtClean="0"/>
+              <a:rPr lang="en-US" dirty="0"/>
               <a:t>Organizations</a:t>
             </a:r>
           </a:p>
           <a:p>
             <a:pPr lvl="1"/>
             <a:r>
-              <a:rPr lang="en-US" dirty="0" smtClean="0"/>
+              <a:rPr lang="en-US" dirty="0"/>
               <a:t>Higher level strategic business activities that affect the operation of the system.</a:t>
             </a:r>
           </a:p>
           <a:p>
             <a:r>
-              <a:rPr lang="en-US" dirty="0" smtClean="0"/>
+              <a:rPr lang="en-US" dirty="0"/>
               <a:t>Society</a:t>
             </a:r>
           </a:p>
           <a:p>
             <a:pPr lvl="1"/>
             <a:r>
-              <a:rPr lang="en-US" dirty="0" smtClean="0"/>
+              <a:rPr lang="en-US" dirty="0"/>
               <a:t>Laws, regulation and culture that affect the operation of the system.</a:t>
             </a:r>
-            <a:endParaRPr lang="en-US" dirty="0"/>
           </a:p>
         </p:txBody>
       </p:sp>
@@ -6815,10 +6655,9 @@
           <a:lstStyle/>
           <a:p>
             <a:r>
-              <a:rPr lang="en-US" smtClean="0"/>
+              <a:rPr lang="en-US"/>
               <a:t>Chapter 10 Dependable Systems</a:t>
             </a:r>
-            <a:endParaRPr lang="en-US"/>
           </a:p>
         </p:txBody>
       </p:sp>
@@ -6862,7 +6701,7 @@
           <a:lstStyle/>
           <a:p>
             <a:r>
-              <a:rPr lang="en-GB" smtClean="0"/>
+              <a:rPr lang="en-GB"/>
               <a:t>30/10/2014</a:t>
             </a:r>
             <a:endParaRPr lang="en-US"/>
@@ -6879,16 +6718,9 @@
   <p:clrMapOvr>
     <a:masterClrMapping/>
   </p:clrMapOvr>
-  <p:transition xmlns:p14="http://schemas.microsoft.com/office/powerpoint/2010/main" spd="med">
+  <p:transition spd="med">
     <p:wipe dir="r"/>
   </p:transition>
-  <p:timing>
-    <p:tnLst>
-      <p:par>
-        <p:cTn xmlns:p14="http://schemas.microsoft.com/office/powerpoint/2010/main" id="1" dur="indefinite" restart="never" nodeType="tmRoot"/>
-      </p:par>
-    </p:tnLst>
-  </p:timing>
 </p:sld>
 </file>
 
@@ -6925,10 +6757,9 @@
           <a:lstStyle/>
           <a:p>
             <a:r>
-              <a:rPr lang="en-US" dirty="0" smtClean="0"/>
+              <a:rPr lang="en-US" dirty="0"/>
               <a:t>Holistic system design</a:t>
             </a:r>
-            <a:endParaRPr lang="en-US" dirty="0"/>
           </a:p>
         </p:txBody>
       </p:sp>
@@ -6948,37 +6779,36 @@
           <a:lstStyle/>
           <a:p>
             <a:r>
-              <a:rPr lang="en-US" dirty="0" smtClean="0"/>
+              <a:rPr lang="en-US" dirty="0"/>
               <a:t>There are interactions and dependencies between the layers in a system and changes at one level ripple through the other levels</a:t>
             </a:r>
           </a:p>
           <a:p>
             <a:pPr lvl="1"/>
             <a:r>
-              <a:rPr lang="en-US" dirty="0" smtClean="0"/>
+              <a:rPr lang="en-US" dirty="0"/>
               <a:t>Example: Change in regulations (society) leads to changes in business processes and application software.</a:t>
             </a:r>
           </a:p>
           <a:p>
             <a:r>
-              <a:rPr lang="en-US" dirty="0" smtClean="0"/>
+              <a:rPr lang="en-US" dirty="0"/>
               <a:t>For dependability, a systems perspective is essential</a:t>
             </a:r>
           </a:p>
           <a:p>
             <a:pPr lvl="1"/>
             <a:r>
-              <a:rPr lang="en-US" dirty="0" smtClean="0"/>
+              <a:rPr lang="en-US" dirty="0"/>
               <a:t>Contain software failures within the enclosing layers of the STS stack.</a:t>
             </a:r>
           </a:p>
           <a:p>
             <a:pPr lvl="1"/>
             <a:r>
-              <a:rPr lang="en-US" dirty="0" smtClean="0"/>
+              <a:rPr lang="en-US" dirty="0"/>
               <a:t>Understand how faults and failures in adjacent layers may affect the software in a system.</a:t>
             </a:r>
-            <a:endParaRPr lang="en-US" dirty="0"/>
           </a:p>
         </p:txBody>
       </p:sp>
@@ -6998,10 +6828,9 @@
           <a:lstStyle/>
           <a:p>
             <a:r>
-              <a:rPr lang="en-US" smtClean="0"/>
+              <a:rPr lang="en-US"/>
               <a:t>Chapter 10 Dependable Systems</a:t>
             </a:r>
-            <a:endParaRPr lang="en-US"/>
           </a:p>
         </p:txBody>
       </p:sp>
@@ -7045,7 +6874,7 @@
           <a:lstStyle/>
           <a:p>
             <a:r>
-              <a:rPr lang="en-GB" smtClean="0"/>
+              <a:rPr lang="en-GB"/>
               <a:t>30/10/2014</a:t>
             </a:r>
             <a:endParaRPr lang="en-US"/>
@@ -7062,16 +6891,9 @@
   <p:clrMapOvr>
     <a:masterClrMapping/>
   </p:clrMapOvr>
-  <p:transition xmlns:p14="http://schemas.microsoft.com/office/powerpoint/2010/main" spd="med">
+  <p:transition spd="med">
     <p:wipe dir="r"/>
   </p:transition>
-  <p:timing>
-    <p:tnLst>
-      <p:par>
-        <p:cTn xmlns:p14="http://schemas.microsoft.com/office/powerpoint/2010/main" id="1" dur="indefinite" restart="never" nodeType="tmRoot"/>
-      </p:par>
-    </p:tnLst>
-  </p:timing>
 </p:sld>
 </file>
 
@@ -7108,10 +6930,9 @@
           <a:lstStyle/>
           <a:p>
             <a:r>
-              <a:rPr lang="en-US" dirty="0" smtClean="0"/>
+              <a:rPr lang="en-US" dirty="0"/>
               <a:t>Regulation and compliance</a:t>
             </a:r>
-            <a:endParaRPr lang="en-US" dirty="0"/>
           </a:p>
         </p:txBody>
       </p:sp>
@@ -7134,32 +6955,11 @@
               <a:rPr lang="en-GB" dirty="0"/>
               <a:t>The general model of economic organization that is now almost universal in the world is that privately owned companies offer goods and services and make a profit on these. </a:t>
             </a:r>
-            <a:endParaRPr lang="en-GB" dirty="0" smtClean="0"/>
-          </a:p>
-          <a:p>
-            <a:r>
-              <a:rPr lang="en-GB" dirty="0" smtClean="0"/>
-              <a:t>To ensure </a:t>
-            </a:r>
+          </a:p>
+          <a:p>
             <a:r>
               <a:rPr lang="en-GB" dirty="0"/>
-              <a:t>the safety of their citizens, most governments </a:t>
-            </a:r>
-            <a:r>
-              <a:rPr lang="en-GB" dirty="0" smtClean="0"/>
-              <a:t>regulate (limit </a:t>
-            </a:r>
-            <a:r>
-              <a:rPr lang="en-GB" dirty="0"/>
-              <a:t>the freedom </a:t>
-            </a:r>
-            <a:r>
-              <a:rPr lang="en-GB" dirty="0" smtClean="0"/>
-              <a:t>of) </a:t>
-            </a:r>
-            <a:r>
-              <a:rPr lang="en-GB" dirty="0"/>
-              <a:t>privately owned companies so that they must follow certain standards to ensure that their products are safe and secure. </a:t>
+              <a:t>To ensure the safety of their citizens, most governments regulate (limit the freedom of) privately owned companies so that they must follow certain standards to ensure that their products are safe and secure. </a:t>
             </a:r>
             <a:endParaRPr lang="en-US" dirty="0"/>
           </a:p>
@@ -7181,7 +6981,7 @@
           <a:lstStyle/>
           <a:p>
             <a:r>
-              <a:rPr lang="en-GB" smtClean="0"/>
+              <a:rPr lang="en-GB"/>
               <a:t>30/10/2014</a:t>
             </a:r>
             <a:endParaRPr lang="en-US"/>
@@ -7204,10 +7004,9 @@
           <a:lstStyle/>
           <a:p>
             <a:r>
-              <a:rPr lang="en-US" smtClean="0"/>
+              <a:rPr lang="en-US"/>
               <a:t>Chapter 10 Dependable Systems</a:t>
             </a:r>
-            <a:endParaRPr lang="en-US"/>
           </a:p>
         </p:txBody>
       </p:sp>
@@ -7244,7 +7043,7 @@
   <p:clrMapOvr>
     <a:masterClrMapping/>
   </p:clrMapOvr>
-  <p:transition xmlns:p14="http://schemas.microsoft.com/office/powerpoint/2010/main" spd="med">
+  <p:transition spd="med">
     <p:wipe dir="r"/>
   </p:transition>
 </p:sld>
@@ -7283,10 +7082,9 @@
           <a:lstStyle/>
           <a:p>
             <a:r>
-              <a:rPr lang="en-US" dirty="0" smtClean="0"/>
+              <a:rPr lang="en-US" dirty="0"/>
               <a:t>Regulated systems</a:t>
             </a:r>
-            <a:endParaRPr lang="en-US" dirty="0"/>
           </a:p>
         </p:txBody>
       </p:sp>
@@ -7306,34 +7104,34 @@
           <a:lstStyle/>
           <a:p>
             <a:r>
-              <a:rPr lang="en-US" dirty="0" smtClean="0"/>
+              <a:rPr lang="en-US" dirty="0"/>
               <a:t>Many critical systems are regulated systems, which means that their use must be approved by an external regulator before the systems go into service. </a:t>
             </a:r>
           </a:p>
           <a:p>
             <a:pPr lvl="1"/>
             <a:r>
-              <a:rPr lang="en-US" dirty="0" smtClean="0"/>
+              <a:rPr lang="en-US" dirty="0"/>
               <a:t>Nuclear systems</a:t>
             </a:r>
           </a:p>
           <a:p>
             <a:pPr lvl="1"/>
             <a:r>
-              <a:rPr lang="en-US" dirty="0" smtClean="0"/>
+              <a:rPr lang="en-US" dirty="0"/>
               <a:t>Air traffic control systems</a:t>
             </a:r>
           </a:p>
           <a:p>
             <a:pPr lvl="1"/>
             <a:r>
-              <a:rPr lang="en-US" dirty="0" smtClean="0"/>
+              <a:rPr lang="en-US" dirty="0"/>
               <a:t>Medical devices</a:t>
             </a:r>
           </a:p>
           <a:p>
             <a:r>
-              <a:rPr lang="en-US" dirty="0" smtClean="0"/>
+              <a:rPr lang="en-US" dirty="0"/>
               <a:t>A safety and dependability case has to be approved by the regulator. Therefore, critical systems development has to create the evidence to convince a regulator that the system is dependable, safe and secure.</a:t>
             </a:r>
           </a:p>
@@ -7358,10 +7156,9 @@
               <a:defRPr/>
             </a:pPr>
             <a:r>
-              <a:rPr lang="en-US" smtClean="0"/>
+              <a:rPr lang="en-US"/>
               <a:t>Chapter 10 Dependable Systems</a:t>
             </a:r>
-            <a:endParaRPr lang="en-US"/>
           </a:p>
         </p:txBody>
       </p:sp>
@@ -7410,7 +7207,7 @@
           <a:lstStyle/>
           <a:p>
             <a:r>
-              <a:rPr lang="en-GB" smtClean="0"/>
+              <a:rPr lang="en-GB"/>
               <a:t>30/10/2014</a:t>
             </a:r>
             <a:endParaRPr lang="en-US"/>
@@ -7427,16 +7224,9 @@
   <p:clrMapOvr>
     <a:masterClrMapping/>
   </p:clrMapOvr>
-  <p:transition xmlns:p14="http://schemas.microsoft.com/office/powerpoint/2010/main" spd="med">
+  <p:transition spd="med">
     <p:wipe dir="r"/>
   </p:transition>
-  <p:timing>
-    <p:tnLst>
-      <p:par>
-        <p:cTn xmlns:p14="http://schemas.microsoft.com/office/powerpoint/2010/main" id="1" dur="indefinite" restart="never" nodeType="tmRoot"/>
-      </p:par>
-    </p:tnLst>
-  </p:timing>
 </p:sld>
 </file>
 
@@ -7473,10 +7263,9 @@
           <a:lstStyle/>
           <a:p>
             <a:r>
-              <a:rPr lang="en-US" dirty="0" smtClean="0"/>
+              <a:rPr lang="en-US" dirty="0"/>
               <a:t>Safety regulation</a:t>
             </a:r>
-            <a:endParaRPr lang="en-US" dirty="0"/>
           </a:p>
         </p:txBody>
       </p:sp>
@@ -7499,35 +7288,24 @@
               <a:rPr lang="en-GB" dirty="0"/>
               <a:t>Regulation and compliance (following the rules) applies to the sociotechnical system as a whole and not simply the software element of that system. </a:t>
             </a:r>
-            <a:endParaRPr lang="en-GB" dirty="0" smtClean="0"/>
-          </a:p>
-          <a:p>
-            <a:r>
-              <a:rPr lang="en-GB" dirty="0" smtClean="0"/>
+          </a:p>
+          <a:p>
+            <a:r>
+              <a:rPr lang="en-GB" dirty="0"/>
               <a:t>Safety-related systems may have to be certified as safe by the regulator.</a:t>
             </a:r>
           </a:p>
           <a:p>
             <a:r>
               <a:rPr lang="en-GB" dirty="0"/>
-              <a:t>To achieve certification, companies that are developing safety-critical systems have to produce an extensive safety case </a:t>
-            </a:r>
-            <a:r>
-              <a:rPr lang="en-GB" dirty="0" smtClean="0"/>
-              <a:t>that </a:t>
-            </a:r>
-            <a:r>
-              <a:rPr lang="en-GB" dirty="0"/>
-              <a:t>shows that rules and regulations have been followed. </a:t>
-            </a:r>
-            <a:endParaRPr lang="en-GB" dirty="0" smtClean="0"/>
+              <a:t>To achieve certification, companies that are developing safety-critical systems have to produce an extensive safety case that shows that rules and regulations have been followed. </a:t>
+            </a:r>
           </a:p>
           <a:p>
             <a:r>
               <a:rPr lang="en-GB" dirty="0"/>
               <a:t>It can be as expensive develop the documentation for certification as it is to develop the system itself. </a:t>
             </a:r>
-            <a:endParaRPr lang="en-GB" dirty="0" smtClean="0"/>
           </a:p>
           <a:p>
             <a:endParaRPr lang="en-US" dirty="0"/>
@@ -7550,7 +7328,7 @@
           <a:lstStyle/>
           <a:p>
             <a:r>
-              <a:rPr lang="en-GB" smtClean="0"/>
+              <a:rPr lang="en-GB"/>
               <a:t>30/10/2014</a:t>
             </a:r>
             <a:endParaRPr lang="en-US"/>
@@ -7573,10 +7351,9 @@
           <a:lstStyle/>
           <a:p>
             <a:r>
-              <a:rPr lang="en-US" smtClean="0"/>
+              <a:rPr lang="en-US"/>
               <a:t>Chapter 10 Dependable Systems</a:t>
             </a:r>
-            <a:endParaRPr lang="en-US"/>
           </a:p>
         </p:txBody>
       </p:sp>
@@ -7613,7 +7390,7 @@
   <p:clrMapOvr>
     <a:masterClrMapping/>
   </p:clrMapOvr>
-  <p:transition xmlns:p14="http://schemas.microsoft.com/office/powerpoint/2010/main" spd="med">
+  <p:transition spd="med">
     <p:wipe dir="r"/>
   </p:transition>
 </p:sld>
@@ -7658,10 +7435,9 @@
           <a:p>
             <a:pPr algn="ctr"/>
             <a:r>
-              <a:rPr lang="en-US" dirty="0" smtClean="0"/>
+              <a:rPr lang="en-US" dirty="0"/>
               <a:t>Redundancy and diversity</a:t>
             </a:r>
-            <a:endParaRPr lang="en-US" dirty="0"/>
           </a:p>
         </p:txBody>
       </p:sp>
@@ -7681,7 +7457,7 @@
           <a:lstStyle/>
           <a:p>
             <a:r>
-              <a:rPr lang="en-GB" smtClean="0"/>
+              <a:rPr lang="en-GB"/>
               <a:t>30/10/2014</a:t>
             </a:r>
             <a:endParaRPr lang="en-US"/>
@@ -7704,10 +7480,9 @@
           <a:lstStyle/>
           <a:p>
             <a:r>
-              <a:rPr lang="en-US" smtClean="0"/>
+              <a:rPr lang="en-US"/>
               <a:t>Chapter 10 Dependable Systems</a:t>
             </a:r>
-            <a:endParaRPr lang="en-US"/>
           </a:p>
         </p:txBody>
       </p:sp>
@@ -7744,7 +7519,7 @@
   <p:clrMapOvr>
     <a:masterClrMapping/>
   </p:clrMapOvr>
-  <p:transition xmlns:p14="http://schemas.microsoft.com/office/powerpoint/2010/main" spd="med">
+  <p:transition spd="med">
     <p:wipe dir="r"/>
   </p:transition>
 </p:sld>
@@ -7783,10 +7558,9 @@
           <a:lstStyle/>
           <a:p>
             <a:r>
-              <a:rPr lang="en-US" dirty="0" smtClean="0"/>
+              <a:rPr lang="en-US" dirty="0"/>
               <a:t>Redundancy and diversity</a:t>
             </a:r>
-            <a:endParaRPr lang="en-US" dirty="0"/>
           </a:p>
         </p:txBody>
       </p:sp>
@@ -7823,23 +7597,7 @@
             </a:pPr>
             <a:r>
               <a:rPr lang="en-US" sz="2000" dirty="0"/>
-              <a:t>Keep more than </a:t>
-            </a:r>
-            <a:r>
-              <a:rPr lang="en-US" sz="2000" dirty="0" smtClean="0"/>
-              <a:t>a single </a:t>
-            </a:r>
-            <a:r>
-              <a:rPr lang="en-US" sz="2000" dirty="0"/>
-              <a:t>version of </a:t>
-            </a:r>
-            <a:r>
-              <a:rPr lang="en-US" sz="2000" dirty="0" smtClean="0"/>
-              <a:t>critical components so </a:t>
-            </a:r>
-            <a:r>
-              <a:rPr lang="en-US" sz="2000" dirty="0"/>
-              <a:t>that if one fails then a backup is available.</a:t>
+              <a:t>Keep more than a single version of critical components so that if one fails then a backup is available.</a:t>
             </a:r>
           </a:p>
           <a:p>
@@ -7861,19 +7619,7 @@
             </a:pPr>
             <a:r>
               <a:rPr lang="en-US" sz="2000" dirty="0"/>
-              <a:t>Provide the same functionality in different ways </a:t>
-            </a:r>
-            <a:r>
-              <a:rPr lang="en-US" sz="2000" dirty="0" smtClean="0"/>
-              <a:t>in different components so </a:t>
-            </a:r>
-            <a:r>
-              <a:rPr lang="en-US" sz="2000" dirty="0"/>
-              <a:t>that they will not fail in the same way</a:t>
-            </a:r>
-            <a:r>
-              <a:rPr lang="en-US" sz="2000" dirty="0" smtClean="0"/>
-              <a:t>. </a:t>
+              <a:t>Provide the same functionality in different ways in different components so that they will not fail in the same way. </a:t>
             </a:r>
             <a:endParaRPr lang="en-US" dirty="0"/>
           </a:p>
@@ -7884,7 +7630,7 @@
               </a:lnSpc>
             </a:pPr>
             <a:r>
-              <a:rPr lang="en-US" sz="2400" dirty="0" smtClean="0"/>
+              <a:rPr lang="en-US" sz="2400" dirty="0"/>
               <a:t>Redundant and diverse components should be independent so that they will not suffer from ‘common-mode’ failures</a:t>
             </a:r>
           </a:p>
@@ -7895,10 +7641,9 @@
               </a:lnSpc>
             </a:pPr>
             <a:r>
-              <a:rPr lang="en-US" sz="2000" dirty="0" smtClean="0"/>
+              <a:rPr lang="en-US" sz="2000" dirty="0"/>
               <a:t>For example, components implemented in different programming languages means that a compiler fault will not affect all of them.</a:t>
             </a:r>
-            <a:endParaRPr lang="en-US" sz="2000" dirty="0"/>
           </a:p>
         </p:txBody>
       </p:sp>
@@ -7950,10 +7695,9 @@
               <a:defRPr/>
             </a:pPr>
             <a:r>
-              <a:rPr lang="en-US" smtClean="0"/>
+              <a:rPr lang="en-US"/>
               <a:t>Chapter 10 Dependable Systems</a:t>
             </a:r>
-            <a:endParaRPr lang="en-US"/>
           </a:p>
         </p:txBody>
       </p:sp>
@@ -7973,7 +7717,7 @@
           <a:lstStyle/>
           <a:p>
             <a:r>
-              <a:rPr lang="en-GB" smtClean="0"/>
+              <a:rPr lang="en-GB"/>
               <a:t>30/10/2014</a:t>
             </a:r>
             <a:endParaRPr lang="en-US"/>
@@ -7990,16 +7734,9 @@
   <p:clrMapOvr>
     <a:masterClrMapping/>
   </p:clrMapOvr>
-  <p:transition xmlns:p14="http://schemas.microsoft.com/office/powerpoint/2010/main" spd="med">
+  <p:transition spd="med">
     <p:wipe dir="r"/>
   </p:transition>
-  <p:timing>
-    <p:tnLst>
-      <p:par>
-        <p:cTn xmlns:p14="http://schemas.microsoft.com/office/powerpoint/2010/main" id="1" dur="indefinite" restart="never" nodeType="tmRoot"/>
-      </p:par>
-    </p:tnLst>
-  </p:timing>
 </p:sld>
 </file>
 
@@ -8150,10 +7887,9 @@
               <a:defRPr/>
             </a:pPr>
             <a:r>
-              <a:rPr lang="en-US" smtClean="0"/>
+              <a:rPr lang="en-US"/>
               <a:t>Chapter 10 Dependable Systems</a:t>
             </a:r>
-            <a:endParaRPr lang="en-US"/>
           </a:p>
         </p:txBody>
       </p:sp>
@@ -8173,7 +7909,7 @@
           <a:lstStyle/>
           <a:p>
             <a:r>
-              <a:rPr lang="en-GB" smtClean="0"/>
+              <a:rPr lang="en-GB"/>
               <a:t>30/10/2014</a:t>
             </a:r>
             <a:endParaRPr lang="en-US"/>
@@ -8190,16 +7926,9 @@
   <p:clrMapOvr>
     <a:masterClrMapping/>
   </p:clrMapOvr>
-  <p:transition xmlns:p14="http://schemas.microsoft.com/office/powerpoint/2010/main" spd="med">
+  <p:transition spd="med">
     <p:wipe dir="r"/>
   </p:transition>
-  <p:timing>
-    <p:tnLst>
-      <p:par>
-        <p:cTn xmlns:p14="http://schemas.microsoft.com/office/powerpoint/2010/main" id="1" dur="indefinite" restart="never" nodeType="tmRoot"/>
-      </p:par>
-    </p:tnLst>
-  </p:timing>
 </p:sld>
 </file>
 
@@ -8236,10 +7965,9 @@
           <a:lstStyle/>
           <a:p>
             <a:r>
-              <a:rPr lang="en-US" dirty="0" smtClean="0"/>
+              <a:rPr lang="en-US" dirty="0"/>
               <a:t>Process diversity and redundancy</a:t>
             </a:r>
-            <a:endParaRPr lang="en-US" dirty="0"/>
           </a:p>
         </p:txBody>
       </p:sp>
@@ -8259,19 +7987,19 @@
           <a:lstStyle/>
           <a:p>
             <a:r>
-              <a:rPr lang="en-US" dirty="0" smtClean="0"/>
+              <a:rPr lang="en-US" dirty="0"/>
               <a:t>Process activities, such as validation, should not depend on a single approach, such as testing, to validate the system.</a:t>
             </a:r>
           </a:p>
           <a:p>
             <a:r>
-              <a:rPr lang="en-US" dirty="0" smtClean="0"/>
+              <a:rPr lang="en-US" dirty="0"/>
               <a:t>Redundant and diverse process activities are important especially for verification and validation.</a:t>
             </a:r>
           </a:p>
           <a:p>
             <a:r>
-              <a:rPr lang="en-US" dirty="0" smtClean="0"/>
+              <a:rPr lang="en-US" dirty="0"/>
               <a:t>Multiple, different process activities the complement each other and allow for cross-checking help to avoid process errors, which may lead to errors in the software.</a:t>
             </a:r>
           </a:p>
@@ -8299,10 +8027,9 @@
               <a:defRPr/>
             </a:pPr>
             <a:r>
-              <a:rPr lang="en-US" smtClean="0"/>
+              <a:rPr lang="en-US"/>
               <a:t>Chapter 10 Dependable Systems</a:t>
             </a:r>
-            <a:endParaRPr lang="en-US"/>
           </a:p>
         </p:txBody>
       </p:sp>
@@ -8351,7 +8078,7 @@
           <a:lstStyle/>
           <a:p>
             <a:r>
-              <a:rPr lang="en-GB" smtClean="0"/>
+              <a:rPr lang="en-GB"/>
               <a:t>30/10/2014</a:t>
             </a:r>
             <a:endParaRPr lang="en-US"/>
@@ -8368,16 +8095,9 @@
   <p:clrMapOvr>
     <a:masterClrMapping/>
   </p:clrMapOvr>
-  <p:transition xmlns:p14="http://schemas.microsoft.com/office/powerpoint/2010/main" spd="med">
+  <p:transition spd="med">
     <p:wipe dir="r"/>
   </p:transition>
-  <p:timing>
-    <p:tnLst>
-      <p:par>
-        <p:cTn xmlns:p14="http://schemas.microsoft.com/office/powerpoint/2010/main" id="1" dur="indefinite" restart="never" nodeType="tmRoot"/>
-      </p:par>
-    </p:tnLst>
-  </p:timing>
 </p:sld>
 </file>
 
@@ -8437,23 +8157,7 @@
           <a:p>
             <a:r>
               <a:rPr lang="en-GB" sz="2400" dirty="0"/>
-              <a:t>For</a:t>
-            </a:r>
-            <a:r>
-              <a:rPr lang="en-GB" sz="2400" dirty="0" smtClean="0"/>
-              <a:t> many computer-based systems</a:t>
-            </a:r>
-            <a:r>
-              <a:rPr lang="en-GB" sz="2400" dirty="0"/>
-              <a:t>,</a:t>
-            </a:r>
-            <a:r>
-              <a:rPr lang="en-GB" sz="2400" dirty="0" smtClean="0"/>
-              <a:t> the </a:t>
-            </a:r>
-            <a:r>
-              <a:rPr lang="en-GB" sz="2400" dirty="0"/>
-              <a:t>most important system property is the dependability of the system.</a:t>
+              <a:t>For many computer-based systems, the most important system property is the dependability of the system.</a:t>
             </a:r>
           </a:p>
           <a:p>
@@ -8461,15 +8165,14 @@
               <a:rPr lang="en-GB" sz="2400" dirty="0"/>
               <a:t>The dependability of a system reflects the user’s degree of trust in that system. It reflects the extent of the user’s confidence that it will operate as users expect and that it will not ‘fail’ in normal use.</a:t>
             </a:r>
-            <a:endParaRPr lang="en-GB" sz="2400" dirty="0" smtClean="0"/>
-          </a:p>
-          <a:p>
-            <a:r>
-              <a:rPr lang="en-GB" sz="2400" dirty="0" smtClean="0"/>
+          </a:p>
+          <a:p>
+            <a:r>
+              <a:rPr lang="en-GB" sz="2400" dirty="0"/>
               <a:t>Dependability covers the related systems attributes of reliability, availability and security. These are all </a:t>
             </a:r>
             <a:r>
-              <a:rPr lang="en-GB" dirty="0" smtClean="0"/>
+              <a:rPr lang="en-GB" dirty="0"/>
               <a:t>inter-dependent.</a:t>
             </a:r>
             <a:endParaRPr lang="en-GB" sz="2400" dirty="0"/>
@@ -8516,10 +8219,9 @@
           <a:lstStyle/>
           <a:p>
             <a:r>
-              <a:rPr lang="en-US" smtClean="0"/>
+              <a:rPr lang="en-US"/>
               <a:t>Chapter 10 Dependable Systems</a:t>
             </a:r>
-            <a:endParaRPr lang="en-US"/>
           </a:p>
         </p:txBody>
       </p:sp>
@@ -8539,7 +8241,7 @@
           <a:lstStyle/>
           <a:p>
             <a:r>
-              <a:rPr lang="en-GB" smtClean="0"/>
+              <a:rPr lang="en-GB"/>
               <a:t>30/10/2014</a:t>
             </a:r>
             <a:endParaRPr lang="en-US"/>
@@ -8556,7 +8258,7 @@
   <p:clrMapOvr>
     <a:masterClrMapping/>
   </p:clrMapOvr>
-  <p:transition xmlns:p14="http://schemas.microsoft.com/office/powerpoint/2010/main" spd="med">
+  <p:transition spd="med">
     <p:wipe dir="r"/>
   </p:transition>
 </p:sld>
@@ -8595,10 +8297,9 @@
           <a:lstStyle/>
           <a:p>
             <a:r>
-              <a:rPr lang="en-US" dirty="0" smtClean="0"/>
+              <a:rPr lang="en-US" dirty="0"/>
               <a:t>Problems with redundancy and diversity</a:t>
             </a:r>
-            <a:endParaRPr lang="en-US" dirty="0"/>
           </a:p>
         </p:txBody>
       </p:sp>
@@ -8623,16 +8324,8 @@
               </a:lnSpc>
             </a:pPr>
             <a:r>
-              <a:rPr lang="en-US" dirty="0" smtClean="0"/>
-              <a:t>Adding diversity </a:t>
-            </a:r>
-            <a:r>
-              <a:rPr lang="en-US" dirty="0"/>
-              <a:t>and redundancy </a:t>
-            </a:r>
-            <a:r>
-              <a:rPr lang="en-US" dirty="0" smtClean="0"/>
-              <a:t>to a system increases the system complexity.</a:t>
+              <a:rPr lang="en-US" dirty="0"/>
+              <a:t>Adding diversity and redundancy to a system increases the system complexity.</a:t>
             </a:r>
           </a:p>
           <a:p>
@@ -8642,18 +8335,9 @@
               </a:lnSpc>
             </a:pPr>
             <a:r>
-              <a:rPr lang="en-US" dirty="0" smtClean="0"/>
-              <a:t>This can </a:t>
-            </a:r>
-            <a:r>
-              <a:rPr lang="en-US" dirty="0"/>
-              <a:t>increase the chances of </a:t>
-            </a:r>
-            <a:r>
-              <a:rPr lang="en-US" dirty="0" smtClean="0"/>
-              <a:t>error because of unanticipated interactions and dependencies between the redundant system components.</a:t>
-            </a:r>
-            <a:endParaRPr lang="en-US" dirty="0"/>
+              <a:rPr lang="en-US" dirty="0"/>
+              <a:t>This can increase the chances of error because of unanticipated interactions and dependencies between the redundant system components.</a:t>
+            </a:r>
           </a:p>
           <a:p>
             <a:pPr>
@@ -8663,27 +8347,7 @@
             </a:pPr>
             <a:r>
               <a:rPr lang="en-US" dirty="0"/>
-              <a:t>Some engineers </a:t>
-            </a:r>
-            <a:r>
-              <a:rPr lang="en-US" dirty="0" smtClean="0"/>
-              <a:t>therefore advocate </a:t>
-            </a:r>
-            <a:r>
-              <a:rPr lang="en-US" dirty="0"/>
-              <a:t>simplicity and extensive V &amp; V </a:t>
-            </a:r>
-            <a:r>
-              <a:rPr lang="en-US" dirty="0" smtClean="0"/>
-              <a:t>as </a:t>
-            </a:r>
-            <a:r>
-              <a:rPr lang="en-US" dirty="0"/>
-              <a:t>a more effective route to software dependability</a:t>
-            </a:r>
-            <a:r>
-              <a:rPr lang="en-US" dirty="0" smtClean="0"/>
-              <a:t>.</a:t>
+              <a:t>Some engineers therefore advocate simplicity and extensive V &amp; V as a more effective route to software dependability.</a:t>
             </a:r>
           </a:p>
           <a:p>
@@ -8693,14 +8357,13 @@
               </a:lnSpc>
             </a:pPr>
             <a:r>
-              <a:rPr lang="en-US" dirty="0" smtClean="0"/>
+              <a:rPr lang="en-US" dirty="0"/>
               <a:t>Airbus FCS architecture is redundant/diverse; Boeing 777 FCS architecture has no software diversity</a:t>
             </a:r>
+          </a:p>
+          <a:p>
             <a:endParaRPr lang="en-US" dirty="0"/>
           </a:p>
-          <a:p>
-            <a:endParaRPr lang="en-US" dirty="0"/>
-          </a:p>
         </p:txBody>
       </p:sp>
       <p:sp>
@@ -8719,7 +8382,7 @@
           <a:lstStyle/>
           <a:p>
             <a:r>
-              <a:rPr lang="en-GB" smtClean="0"/>
+              <a:rPr lang="en-GB"/>
               <a:t>30/10/2014</a:t>
             </a:r>
             <a:endParaRPr lang="en-US"/>
@@ -8742,10 +8405,9 @@
           <a:lstStyle/>
           <a:p>
             <a:r>
-              <a:rPr lang="en-US" smtClean="0"/>
+              <a:rPr lang="en-US"/>
               <a:t>Chapter 10 Dependable Systems</a:t>
             </a:r>
-            <a:endParaRPr lang="en-US"/>
           </a:p>
         </p:txBody>
       </p:sp>
@@ -8782,7 +8444,7 @@
   <p:clrMapOvr>
     <a:masterClrMapping/>
   </p:clrMapOvr>
-  <p:transition xmlns:p14="http://schemas.microsoft.com/office/powerpoint/2010/main" spd="med">
+  <p:transition spd="med">
     <p:wipe dir="r"/>
   </p:transition>
 </p:sld>
@@ -8827,10 +8489,9 @@
           <a:p>
             <a:pPr algn="ctr"/>
             <a:r>
-              <a:rPr lang="en-US" dirty="0" smtClean="0"/>
+              <a:rPr lang="en-US" dirty="0"/>
               <a:t>Dependable processes</a:t>
             </a:r>
-            <a:endParaRPr lang="en-US" dirty="0"/>
           </a:p>
         </p:txBody>
       </p:sp>
@@ -8850,7 +8511,7 @@
           <a:lstStyle/>
           <a:p>
             <a:r>
-              <a:rPr lang="en-GB" smtClean="0"/>
+              <a:rPr lang="en-GB"/>
               <a:t>30/10/2014</a:t>
             </a:r>
             <a:endParaRPr lang="en-US"/>
@@ -8873,10 +8534,9 @@
           <a:lstStyle/>
           <a:p>
             <a:r>
-              <a:rPr lang="en-US" smtClean="0"/>
+              <a:rPr lang="en-US"/>
               <a:t>Chapter 10 Dependable Systems</a:t>
             </a:r>
-            <a:endParaRPr lang="en-US"/>
           </a:p>
         </p:txBody>
       </p:sp>
@@ -8913,7 +8573,7 @@
   <p:clrMapOvr>
     <a:masterClrMapping/>
   </p:clrMapOvr>
-  <p:transition xmlns:p14="http://schemas.microsoft.com/office/powerpoint/2010/main" spd="med">
+  <p:transition spd="med">
     <p:wipe dir="r"/>
   </p:transition>
 </p:sld>
@@ -8987,16 +8647,12 @@
           <a:p>
             <a:r>
               <a:rPr lang="en-GB" dirty="0"/>
-              <a:t>A well-defined repeatable process is one that does not depend entirely on individual skills; rather can be enacted by different people</a:t>
-            </a:r>
-            <a:r>
-              <a:rPr lang="en-GB" dirty="0" smtClean="0"/>
-              <a:t>.</a:t>
-            </a:r>
-          </a:p>
-          <a:p>
-            <a:r>
-              <a:rPr lang="en-GB" dirty="0" smtClean="0"/>
+              <a:t>A well-defined repeatable process is one that does not depend entirely on individual skills; rather can be enacted by different people.</a:t>
+            </a:r>
+          </a:p>
+          <a:p>
+            <a:r>
+              <a:rPr lang="en-GB" dirty="0"/>
               <a:t>Regulators use information about the process to check if good software engineering practice has been used.</a:t>
             </a:r>
           </a:p>
@@ -9056,10 +8712,9 @@
               <a:defRPr/>
             </a:pPr>
             <a:r>
-              <a:rPr lang="en-US" smtClean="0"/>
+              <a:rPr lang="en-US"/>
               <a:t>Chapter 10 Dependable Systems</a:t>
             </a:r>
-            <a:endParaRPr lang="en-US"/>
           </a:p>
         </p:txBody>
       </p:sp>
@@ -9079,7 +8734,7 @@
           <a:lstStyle/>
           <a:p>
             <a:r>
-              <a:rPr lang="en-GB" smtClean="0"/>
+              <a:rPr lang="en-GB"/>
               <a:t>30/10/2014</a:t>
             </a:r>
             <a:endParaRPr lang="en-US"/>
@@ -9096,14 +8751,7 @@
   <p:clrMapOvr>
     <a:masterClrMapping/>
   </p:clrMapOvr>
-  <p:transition xmlns:p14="http://schemas.microsoft.com/office/powerpoint/2010/main"/>
-  <p:timing>
-    <p:tnLst>
-      <p:par>
-        <p:cTn xmlns:p14="http://schemas.microsoft.com/office/powerpoint/2010/main" id="1" dur="indefinite" restart="never" nodeType="tmRoot"/>
-      </p:par>
-    </p:tnLst>
-  </p:timing>
+  <p:transition/>
 </p:sld>
 </file>
 
@@ -9140,10 +8788,9 @@
           <a:lstStyle/>
           <a:p>
             <a:r>
-              <a:rPr lang="en-US" dirty="0" smtClean="0"/>
+              <a:rPr lang="en-US" dirty="0"/>
               <a:t>Dependable process characteristics</a:t>
             </a:r>
-            <a:endParaRPr lang="en-US" dirty="0"/>
           </a:p>
         </p:txBody>
       </p:sp>
@@ -9163,50 +8810,29 @@
           <a:lstStyle/>
           <a:p>
             <a:r>
-              <a:rPr lang="en-US" dirty="0" smtClean="0"/>
-              <a:t>Explicitly </a:t>
-            </a:r>
-            <a:r>
-              <a:rPr lang="en-US" dirty="0"/>
-              <a:t>defined </a:t>
-            </a:r>
-            <a:endParaRPr lang="en-US" dirty="0" smtClean="0"/>
+              <a:rPr lang="en-US" dirty="0"/>
+              <a:t>Explicitly defined </a:t>
+            </a:r>
           </a:p>
           <a:p>
             <a:pPr lvl="1"/>
             <a:r>
-              <a:rPr lang="en-US" dirty="0" smtClean="0"/>
-              <a:t>A process that </a:t>
-            </a:r>
-            <a:r>
-              <a:rPr lang="en-US" dirty="0"/>
-              <a:t>has a defined process model that is used to drive the software production process. Data must be collected during the process that proves that the development team has followed the process as defined in the process model.</a:t>
+              <a:rPr lang="en-US" dirty="0"/>
+              <a:t>A process that has a defined process model that is used to drive the software production process. Data must be collected during the process that proves that the development team has followed the process as defined in the process model.</a:t>
             </a:r>
             <a:endParaRPr lang="en-GB" dirty="0"/>
           </a:p>
           <a:p>
             <a:r>
-              <a:rPr lang="en-US" dirty="0" smtClean="0"/>
+              <a:rPr lang="en-US" dirty="0"/>
               <a:t>Repeatable</a:t>
             </a:r>
           </a:p>
           <a:p>
             <a:pPr lvl="1"/>
             <a:r>
-              <a:rPr lang="en-US" dirty="0" smtClean="0"/>
-              <a:t>A process that </a:t>
-            </a:r>
-            <a:r>
-              <a:rPr lang="en-US" dirty="0"/>
-              <a:t>does not rely on individual interpretation and judgment. </a:t>
-            </a:r>
-            <a:r>
-              <a:rPr lang="en-US" dirty="0" smtClean="0"/>
-              <a:t>The process </a:t>
-            </a:r>
-            <a:r>
-              <a:rPr lang="en-US" dirty="0"/>
-              <a:t>can be repeated across projects and with different team members, irrespective of who is involved in the development. </a:t>
+              <a:rPr lang="en-US" dirty="0"/>
+              <a:t>A process that does not rely on individual interpretation and judgment. The process can be repeated across projects and with different team members, irrespective of who is involved in the development. </a:t>
             </a:r>
           </a:p>
         </p:txBody>
@@ -9227,7 +8853,7 @@
           <a:lstStyle/>
           <a:p>
             <a:r>
-              <a:rPr lang="en-GB" smtClean="0"/>
+              <a:rPr lang="en-GB"/>
               <a:t>30/10/2014</a:t>
             </a:r>
             <a:endParaRPr lang="en-US"/>
@@ -9250,10 +8876,9 @@
           <a:lstStyle/>
           <a:p>
             <a:r>
-              <a:rPr lang="en-US" smtClean="0"/>
+              <a:rPr lang="en-US"/>
               <a:t>Chapter 10 Dependable Systems</a:t>
             </a:r>
-            <a:endParaRPr lang="en-US"/>
           </a:p>
         </p:txBody>
       </p:sp>
@@ -9290,7 +8915,7 @@
   <p:clrMapOvr>
     <a:masterClrMapping/>
   </p:clrMapOvr>
-  <p:transition xmlns:p14="http://schemas.microsoft.com/office/powerpoint/2010/main" spd="med">
+  <p:transition spd="med">
     <p:wipe dir="r"/>
   </p:transition>
 </p:sld>
@@ -9329,14 +8954,14 @@
           <a:lstStyle/>
           <a:p>
             <a:r>
-              <a:rPr lang="en-US" dirty="0" smtClean="0"/>
+              <a:rPr lang="en-US" dirty="0"/>
               <a:t>Attributes of dependable processes</a:t>
             </a:r>
             <a:r>
-              <a:rPr lang="en-GB" dirty="0" smtClean="0"/>
+              <a:rPr lang="en-GB" dirty="0"/>
               <a:t> </a:t>
             </a:r>
-            <a:endParaRPr lang="en-US" dirty="0" smtClean="0"/>
+            <a:endParaRPr lang="en-US" dirty="0"/>
           </a:p>
         </p:txBody>
       </p:sp>
@@ -9356,7 +8981,7 @@
         </p:nvGraphicFramePr>
         <p:xfrm>
           <a:off x="1118650" y="1715767"/>
-          <a:ext cx="7296480" cy="4616930"/>
+          <a:ext cx="7296480" cy="4616931"/>
         </p:xfrm>
         <a:graphic>
           <a:graphicData uri="http://schemas.openxmlformats.org/drawingml/2006/table">
@@ -9365,8 +8990,20 @@
                 <a:tableStyleId>{5C22544A-7EE6-4342-B048-85BDC9FD1C3A}</a:tableStyleId>
               </a:tblPr>
               <a:tblGrid>
-                <a:gridCol w="2785034"/>
-                <a:gridCol w="4511446"/>
+                <a:gridCol w="2785034">
+                  <a:extLst>
+                    <a:ext uri="{9D8B030D-6E8A-4147-A177-3AD203B41FA5}">
+                      <a16:colId xmlns:a16="http://schemas.microsoft.com/office/drawing/2014/main" val="20000"/>
+                    </a:ext>
+                  </a:extLst>
+                </a:gridCol>
+                <a:gridCol w="4511446">
+                  <a:extLst>
+                    <a:ext uri="{9D8B030D-6E8A-4147-A177-3AD203B41FA5}">
+                      <a16:colId xmlns:a16="http://schemas.microsoft.com/office/drawing/2014/main" val="20001"/>
+                    </a:ext>
+                  </a:extLst>
+                </a:gridCol>
               </a:tblGrid>
               <a:tr h="392001">
                 <a:tc>
@@ -9405,7 +9042,7 @@
                         </a:spcAft>
                       </a:pPr>
                       <a:r>
-                        <a:rPr lang="en-GB" sz="1400" b="1" dirty="0" smtClean="0">
+                        <a:rPr lang="en-GB" sz="1400" b="1" dirty="0">
                           <a:solidFill>
                             <a:srgbClr val="000000"/>
                           </a:solidFill>
@@ -9415,18 +9052,15 @@
                         </a:rPr>
                         <a:t>Description</a:t>
                       </a:r>
-                      <a:endParaRPr lang="en-GB" sz="1400" b="1" dirty="0">
-                        <a:solidFill>
-                          <a:srgbClr val="000000"/>
-                        </a:solidFill>
-                        <a:latin typeface="Helvetica"/>
-                        <a:ea typeface="Times New Roman"/>
-                        <a:cs typeface="Helvetica"/>
-                      </a:endParaRPr>
                     </a:p>
                   </a:txBody>
                   <a:tcPr marL="73025" marR="73025" marT="73025" marB="73025"/>
                 </a:tc>
+                <a:extLst>
+                  <a:ext uri="{0D108BD9-81ED-4DB2-BD59-A6C34878D82A}">
+                    <a16:rowId xmlns:a16="http://schemas.microsoft.com/office/drawing/2014/main" val="10000"/>
+                  </a:ext>
+                </a:extLst>
               </a:tr>
               <a:tr h="392001">
                 <a:tc>
@@ -9485,6 +9119,11 @@
                   </a:txBody>
                   <a:tcPr marL="73025" marR="73025" marT="0" marB="73025"/>
                 </a:tc>
+                <a:extLst>
+                  <a:ext uri="{0D108BD9-81ED-4DB2-BD59-A6C34878D82A}">
+                    <a16:rowId xmlns:a16="http://schemas.microsoft.com/office/drawing/2014/main" val="10001"/>
+                  </a:ext>
+                </a:extLst>
               </a:tr>
               <a:tr h="392001">
                 <a:tc>
@@ -9543,6 +9182,11 @@
                   </a:txBody>
                   <a:tcPr marL="73025" marR="73025" marT="0" marB="73025"/>
                 </a:tc>
+                <a:extLst>
+                  <a:ext uri="{0D108BD9-81ED-4DB2-BD59-A6C34878D82A}">
+                    <a16:rowId xmlns:a16="http://schemas.microsoft.com/office/drawing/2014/main" val="10002"/>
+                  </a:ext>
+                </a:extLst>
               </a:tr>
               <a:tr h="1010476">
                 <a:tc>
@@ -9601,6 +9245,11 @@
                   </a:txBody>
                   <a:tcPr marL="73025" marR="73025" marT="0" marB="73025"/>
                 </a:tc>
+                <a:extLst>
+                  <a:ext uri="{0D108BD9-81ED-4DB2-BD59-A6C34878D82A}">
+                    <a16:rowId xmlns:a16="http://schemas.microsoft.com/office/drawing/2014/main" val="10003"/>
+                  </a:ext>
+                </a:extLst>
               </a:tr>
               <a:tr h="1010476">
                 <a:tc>
@@ -9659,6 +9308,11 @@
                   </a:txBody>
                   <a:tcPr marL="73025" marR="73025" marT="0" marB="73025"/>
                 </a:tc>
+                <a:extLst>
+                  <a:ext uri="{0D108BD9-81ED-4DB2-BD59-A6C34878D82A}">
+                    <a16:rowId xmlns:a16="http://schemas.microsoft.com/office/drawing/2014/main" val="10004"/>
+                  </a:ext>
+                </a:extLst>
               </a:tr>
               <a:tr h="777768">
                 <a:tc>
@@ -9717,6 +9371,11 @@
                   </a:txBody>
                   <a:tcPr marL="73025" marR="73025" marT="0" marB="73025"/>
                 </a:tc>
+                <a:extLst>
+                  <a:ext uri="{0D108BD9-81ED-4DB2-BD59-A6C34878D82A}">
+                    <a16:rowId xmlns:a16="http://schemas.microsoft.com/office/drawing/2014/main" val="10005"/>
+                  </a:ext>
+                </a:extLst>
               </a:tr>
             </a:tbl>
           </a:graphicData>
@@ -9770,10 +9429,9 @@
               <a:defRPr/>
             </a:pPr>
             <a:r>
-              <a:rPr lang="en-US" smtClean="0"/>
+              <a:rPr lang="en-US"/>
               <a:t>Chapter 10 Dependable Systems</a:t>
             </a:r>
-            <a:endParaRPr lang="en-US"/>
           </a:p>
         </p:txBody>
       </p:sp>
@@ -9793,7 +9451,7 @@
           <a:lstStyle/>
           <a:p>
             <a:r>
-              <a:rPr lang="en-GB" smtClean="0"/>
+              <a:rPr lang="en-GB"/>
               <a:t>30/10/2014</a:t>
             </a:r>
             <a:endParaRPr lang="en-US"/>
@@ -9810,16 +9468,9 @@
   <p:clrMapOvr>
     <a:masterClrMapping/>
   </p:clrMapOvr>
-  <p:transition xmlns:p14="http://schemas.microsoft.com/office/powerpoint/2010/main" spd="med">
+  <p:transition spd="med">
     <p:wipe dir="r"/>
   </p:transition>
-  <p:timing>
-    <p:tnLst>
-      <p:par>
-        <p:cTn xmlns:p14="http://schemas.microsoft.com/office/powerpoint/2010/main" id="1" dur="indefinite" restart="never" nodeType="tmRoot"/>
-      </p:par>
-    </p:tnLst>
-  </p:timing>
 </p:sld>
 </file>
 
@@ -9856,10 +9507,9 @@
           <a:lstStyle/>
           <a:p>
             <a:r>
-              <a:rPr lang="en-US" dirty="0" smtClean="0"/>
+              <a:rPr lang="en-US" dirty="0"/>
               <a:t>Dependable process activities</a:t>
             </a:r>
-            <a:endParaRPr lang="en-US" dirty="0"/>
           </a:p>
         </p:txBody>
       </p:sp>
@@ -9894,46 +9544,21 @@
           </a:p>
           <a:p>
             <a:r>
-              <a:rPr lang="en-US" dirty="0" smtClean="0"/>
-              <a:t>Requirements </a:t>
-            </a:r>
-            <a:r>
-              <a:rPr lang="en-US" dirty="0"/>
-              <a:t>management to ensure that changes to the requirements are controlled and that the impact of proposed requirements changes </a:t>
-            </a:r>
-            <a:r>
-              <a:rPr lang="en-US" dirty="0" smtClean="0"/>
-              <a:t>is understood.</a:t>
+              <a:rPr lang="en-US" dirty="0"/>
+              <a:t>Requirements management to ensure that changes to the requirements are controlled and that the impact of proposed requirements changes is understood.</a:t>
             </a:r>
             <a:endParaRPr lang="en-GB" dirty="0"/>
           </a:p>
           <a:p>
             <a:r>
-              <a:rPr lang="en-US" dirty="0" smtClean="0"/>
-              <a:t>Formal </a:t>
-            </a:r>
-            <a:r>
-              <a:rPr lang="en-US" dirty="0"/>
-              <a:t>specification, where a mathematical model of the software is created and analyzed. </a:t>
-            </a:r>
-            <a:endParaRPr lang="en-US" dirty="0" smtClean="0"/>
-          </a:p>
-          <a:p>
-            <a:r>
-              <a:rPr lang="en-US" dirty="0" smtClean="0"/>
-              <a:t>System </a:t>
-            </a:r>
-            <a:r>
-              <a:rPr lang="en-US" dirty="0"/>
-              <a:t>modeling, where the software design is explicitly documented as a set of graphical models, and the links between the requirements and these models are </a:t>
-            </a:r>
-            <a:r>
-              <a:rPr lang="en-US" dirty="0" smtClean="0"/>
-              <a:t>documented</a:t>
-            </a:r>
-            <a:r>
-              <a:rPr lang="en-US" dirty="0"/>
-              <a:t>. </a:t>
+              <a:rPr lang="en-US" dirty="0"/>
+              <a:t>Formal specification, where a mathematical model of the software is created and analyzed. </a:t>
+            </a:r>
+          </a:p>
+          <a:p>
+            <a:r>
+              <a:rPr lang="en-US" dirty="0"/>
+              <a:t>System modeling, where the software design is explicitly documented as a set of graphical models, and the links between the requirements and these models are documented. </a:t>
             </a:r>
           </a:p>
         </p:txBody>
@@ -9954,7 +9579,7 @@
           <a:lstStyle/>
           <a:p>
             <a:r>
-              <a:rPr lang="en-GB" smtClean="0"/>
+              <a:rPr lang="en-GB"/>
               <a:t>30/10/2014</a:t>
             </a:r>
             <a:endParaRPr lang="en-US"/>
@@ -9977,10 +9602,9 @@
           <a:lstStyle/>
           <a:p>
             <a:r>
-              <a:rPr lang="en-US" smtClean="0"/>
+              <a:rPr lang="en-US"/>
               <a:t>Chapter 10 Dependable Systems</a:t>
             </a:r>
-            <a:endParaRPr lang="en-US"/>
           </a:p>
         </p:txBody>
       </p:sp>
@@ -10017,7 +9641,7 @@
   <p:clrMapOvr>
     <a:masterClrMapping/>
   </p:clrMapOvr>
-  <p:transition xmlns:p14="http://schemas.microsoft.com/office/powerpoint/2010/main" spd="med">
+  <p:transition spd="med">
     <p:wipe dir="r"/>
   </p:transition>
 </p:sld>
@@ -10056,79 +9680,63 @@
           <a:lstStyle/>
           <a:p>
             <a:r>
-              <a:rPr lang="en-US" dirty="0" smtClean="0"/>
+              <a:rPr lang="en-US" dirty="0"/>
               <a:t>Dependable process activities</a:t>
             </a:r>
+          </a:p>
+        </p:txBody>
+      </p:sp>
+      <p:sp>
+        <p:nvSpPr>
+          <p:cNvPr id="3" name="Content Placeholder 2"/>
+          <p:cNvSpPr>
+            <a:spLocks noGrp="1"/>
+          </p:cNvSpPr>
+          <p:nvPr>
+            <p:ph idx="1"/>
+          </p:nvPr>
+        </p:nvSpPr>
+        <p:spPr/>
+        <p:txBody>
+          <a:bodyPr/>
+          <a:lstStyle/>
+          <a:p>
+            <a:r>
+              <a:rPr lang="en-US" dirty="0"/>
+              <a:t>Design and program inspections, where the different descriptions of the system are inspected and checked by different people. </a:t>
+            </a:r>
+            <a:r>
+              <a:rPr lang="en-GB" dirty="0"/>
+              <a:t> </a:t>
+            </a:r>
+          </a:p>
+          <a:p>
+            <a:r>
+              <a:rPr lang="en-US" dirty="0"/>
+              <a:t>Static analysis, where automated checks are carried out on the source code of the program. </a:t>
+            </a:r>
+          </a:p>
+          <a:p>
+            <a:r>
+              <a:rPr lang="en-US" dirty="0"/>
+              <a:t>Test planning and management, where a comprehensive set of system tests is designed. </a:t>
+            </a:r>
+          </a:p>
+          <a:p>
+            <a:pPr lvl="1"/>
+            <a:r>
+              <a:rPr lang="en-US" dirty="0"/>
+              <a:t>The testing process has to be carefully managed to demonstrate that these tests provide coverage of the system requirements and have been correctly applied in the testing process.</a:t>
+            </a:r>
+            <a:endParaRPr lang="en-GB" dirty="0"/>
+          </a:p>
+          <a:p>
             <a:endParaRPr lang="en-US" dirty="0"/>
           </a:p>
         </p:txBody>
       </p:sp>
       <p:sp>
         <p:nvSpPr>
-          <p:cNvPr id="3" name="Content Placeholder 2"/>
-          <p:cNvSpPr>
-            <a:spLocks noGrp="1"/>
-          </p:cNvSpPr>
-          <p:nvPr>
-            <p:ph idx="1"/>
-          </p:nvPr>
-        </p:nvSpPr>
-        <p:spPr/>
-        <p:txBody>
-          <a:bodyPr/>
-          <a:lstStyle/>
-          <a:p>
-            <a:r>
-              <a:rPr lang="en-US" dirty="0"/>
-              <a:t>Design and program inspections, where the different descriptions of the system are inspected and checked by different people. </a:t>
-            </a:r>
-            <a:r>
-              <a:rPr lang="en-GB" dirty="0" smtClean="0"/>
-              <a:t> </a:t>
-            </a:r>
-            <a:endParaRPr lang="en-GB" dirty="0"/>
-          </a:p>
-          <a:p>
-            <a:r>
-              <a:rPr lang="en-US" dirty="0" smtClean="0"/>
-              <a:t>Static </a:t>
-            </a:r>
-            <a:r>
-              <a:rPr lang="en-US" dirty="0"/>
-              <a:t>analysis, where automated checks are carried out on the source code of the program. </a:t>
-            </a:r>
-            <a:endParaRPr lang="en-US" dirty="0" smtClean="0"/>
-          </a:p>
-          <a:p>
-            <a:r>
-              <a:rPr lang="en-US" dirty="0" smtClean="0"/>
-              <a:t>Test </a:t>
-            </a:r>
-            <a:r>
-              <a:rPr lang="en-US" dirty="0"/>
-              <a:t>planning and management, where a comprehensive set of system tests is designed. </a:t>
-            </a:r>
-            <a:endParaRPr lang="en-US" dirty="0" smtClean="0"/>
-          </a:p>
-          <a:p>
-            <a:pPr lvl="1"/>
-            <a:r>
-              <a:rPr lang="en-US" dirty="0" smtClean="0"/>
-              <a:t>The </a:t>
-            </a:r>
-            <a:r>
-              <a:rPr lang="en-US" dirty="0"/>
-              <a:t>testing process has to be carefully managed to demonstrate that these tests provide coverage of the system requirements and have been correctly applied in the testing process.</a:t>
-            </a:r>
-            <a:endParaRPr lang="en-GB" dirty="0"/>
-          </a:p>
-          <a:p>
-            <a:endParaRPr lang="en-US" dirty="0"/>
-          </a:p>
-        </p:txBody>
-      </p:sp>
-      <p:sp>
-        <p:nvSpPr>
           <p:cNvPr id="4" name="Date Placeholder 3"/>
           <p:cNvSpPr>
             <a:spLocks noGrp="1"/>
@@ -10143,7 +9751,7 @@
           <a:lstStyle/>
           <a:p>
             <a:r>
-              <a:rPr lang="en-GB" smtClean="0"/>
+              <a:rPr lang="en-GB"/>
               <a:t>30/10/2014</a:t>
             </a:r>
             <a:endParaRPr lang="en-US"/>
@@ -10166,10 +9774,9 @@
           <a:lstStyle/>
           <a:p>
             <a:r>
-              <a:rPr lang="en-US" smtClean="0"/>
+              <a:rPr lang="en-US"/>
               <a:t>Chapter 10 Dependable Systems</a:t>
             </a:r>
-            <a:endParaRPr lang="en-US"/>
           </a:p>
         </p:txBody>
       </p:sp>
@@ -10206,7 +9813,7 @@
   <p:clrMapOvr>
     <a:masterClrMapping/>
   </p:clrMapOvr>
-  <p:transition xmlns:p14="http://schemas.microsoft.com/office/powerpoint/2010/main" spd="med">
+  <p:transition spd="med">
     <p:wipe dir="r"/>
   </p:transition>
 </p:sld>
@@ -10245,10 +9852,9 @@
           <a:lstStyle/>
           <a:p>
             <a:r>
-              <a:rPr lang="en-US" dirty="0" smtClean="0"/>
+              <a:rPr lang="en-US" dirty="0"/>
               <a:t>Dependable processes and agility</a:t>
             </a:r>
-            <a:endParaRPr lang="en-US" dirty="0"/>
           </a:p>
         </p:txBody>
       </p:sp>
@@ -10269,47 +9875,27 @@
           <a:p>
             <a:r>
               <a:rPr lang="en-US" dirty="0"/>
-              <a:t>Dependable software often requires certification so both process and product documentation has to be produced</a:t>
-            </a:r>
-            <a:r>
-              <a:rPr lang="en-US" dirty="0" smtClean="0"/>
-              <a:t>.</a:t>
-            </a:r>
-          </a:p>
-          <a:p>
-            <a:r>
-              <a:rPr lang="en-US" dirty="0"/>
-              <a:t>Up-front requirements analysis is also essential to discover </a:t>
-            </a:r>
-            <a:r>
-              <a:rPr lang="en-US" dirty="0" smtClean="0"/>
-              <a:t>requirements </a:t>
-            </a:r>
-            <a:r>
-              <a:rPr lang="en-US" dirty="0"/>
-              <a:t>and requirements conflicts that may compromise the safety and security of the system.</a:t>
+              <a:t>Dependable software often requires certification so both process and product documentation has to be produced.</a:t>
+            </a:r>
+          </a:p>
+          <a:p>
+            <a:r>
+              <a:rPr lang="en-US" dirty="0"/>
+              <a:t>Up-front requirements analysis is also essential to discover requirements and requirements conflicts that may compromise the safety and security of the system.</a:t>
             </a:r>
             <a:r>
               <a:rPr lang="en-GB" dirty="0"/>
               <a:t> </a:t>
             </a:r>
             <a:r>
-              <a:rPr lang="en-US" dirty="0" smtClean="0"/>
+              <a:rPr lang="en-US" dirty="0"/>
               <a:t> </a:t>
             </a:r>
           </a:p>
           <a:p>
             <a:r>
               <a:rPr lang="en-US" dirty="0"/>
-              <a:t>These </a:t>
-            </a:r>
-            <a:r>
-              <a:rPr lang="en-US" dirty="0" smtClean="0"/>
-              <a:t>conflict </a:t>
-            </a:r>
-            <a:r>
-              <a:rPr lang="en-US" dirty="0"/>
-              <a:t>with the general approach in agile development of co-development of the requirements and the system and minimizing documentation.</a:t>
+              <a:t>These conflict with the general approach in agile development of co-development of the requirements and the system and minimizing documentation.</a:t>
             </a:r>
             <a:r>
               <a:rPr lang="en-GB" dirty="0"/>
@@ -10335,7 +9921,7 @@
           <a:lstStyle/>
           <a:p>
             <a:r>
-              <a:rPr lang="en-GB" smtClean="0"/>
+              <a:rPr lang="en-GB"/>
               <a:t>30/10/2014</a:t>
             </a:r>
             <a:endParaRPr lang="en-US"/>
@@ -10358,10 +9944,9 @@
           <a:lstStyle/>
           <a:p>
             <a:r>
-              <a:rPr lang="en-US" smtClean="0"/>
+              <a:rPr lang="en-US"/>
               <a:t>Chapter 10 Dependable Systems</a:t>
             </a:r>
-            <a:endParaRPr lang="en-US"/>
           </a:p>
         </p:txBody>
       </p:sp>
@@ -10398,7 +9983,7 @@
   <p:clrMapOvr>
     <a:masterClrMapping/>
   </p:clrMapOvr>
-  <p:transition xmlns:p14="http://schemas.microsoft.com/office/powerpoint/2010/main" spd="med">
+  <p:transition spd="med">
     <p:wipe dir="r"/>
   </p:transition>
 </p:sld>
@@ -10437,66 +10022,51 @@
           <a:lstStyle/>
           <a:p>
             <a:r>
-              <a:rPr lang="en-US" dirty="0" smtClean="0"/>
+              <a:rPr lang="en-US" dirty="0"/>
               <a:t>Dependable processes and agility</a:t>
             </a:r>
+          </a:p>
+        </p:txBody>
+      </p:sp>
+      <p:sp>
+        <p:nvSpPr>
+          <p:cNvPr id="3" name="Content Placeholder 2"/>
+          <p:cNvSpPr>
+            <a:spLocks noGrp="1"/>
+          </p:cNvSpPr>
+          <p:nvPr>
+            <p:ph idx="1"/>
+          </p:nvPr>
+        </p:nvSpPr>
+        <p:spPr/>
+        <p:txBody>
+          <a:bodyPr/>
+          <a:lstStyle/>
+          <a:p>
+            <a:r>
+              <a:rPr lang="en-US" dirty="0"/>
+              <a:t>An agile process may be defined that incorporates techniques such as iterative development, test-first development and user involvement in the development team.  </a:t>
+            </a:r>
+          </a:p>
+          <a:p>
+            <a:r>
+              <a:rPr lang="en-US" dirty="0"/>
+              <a:t>So long as the team follows that process and documents their actions, agile methods can be used. </a:t>
+            </a:r>
+          </a:p>
+          <a:p>
+            <a:r>
+              <a:rPr lang="en-US" dirty="0"/>
+              <a:t>However, additional documentation and planning is essential so ‘pure agile’ is impractical for dependable systems engineering.</a:t>
+            </a:r>
+          </a:p>
+          <a:p>
             <a:endParaRPr lang="en-US" dirty="0"/>
           </a:p>
         </p:txBody>
       </p:sp>
       <p:sp>
         <p:nvSpPr>
-          <p:cNvPr id="3" name="Content Placeholder 2"/>
-          <p:cNvSpPr>
-            <a:spLocks noGrp="1"/>
-          </p:cNvSpPr>
-          <p:nvPr>
-            <p:ph idx="1"/>
-          </p:nvPr>
-        </p:nvSpPr>
-        <p:spPr/>
-        <p:txBody>
-          <a:bodyPr/>
-          <a:lstStyle/>
-          <a:p>
-            <a:r>
-              <a:rPr lang="en-US" dirty="0"/>
-              <a:t>An agile process may be defined that incorporates techniques such as iterative development, test-first development and user involvement in the development team.  </a:t>
-            </a:r>
-            <a:endParaRPr lang="en-US" dirty="0" smtClean="0"/>
-          </a:p>
-          <a:p>
-            <a:r>
-              <a:rPr lang="en-US" dirty="0" smtClean="0"/>
-              <a:t>So </a:t>
-            </a:r>
-            <a:r>
-              <a:rPr lang="en-US" dirty="0"/>
-              <a:t>long as the team follows that process and documents their actions, agile </a:t>
-            </a:r>
-            <a:r>
-              <a:rPr lang="en-US" dirty="0" smtClean="0"/>
-              <a:t>methods can </a:t>
-            </a:r>
-            <a:r>
-              <a:rPr lang="en-US" dirty="0"/>
-              <a:t>be used. </a:t>
-            </a:r>
-            <a:endParaRPr lang="en-US" dirty="0" smtClean="0"/>
-          </a:p>
-          <a:p>
-            <a:r>
-              <a:rPr lang="en-US" dirty="0" smtClean="0"/>
-              <a:t>However, additional documentation and planning is essential so ‘pure agile’ is impractical for dependable systems engineering.</a:t>
-            </a:r>
-          </a:p>
-          <a:p>
-            <a:endParaRPr lang="en-US" dirty="0"/>
-          </a:p>
-        </p:txBody>
-      </p:sp>
-      <p:sp>
-        <p:nvSpPr>
           <p:cNvPr id="4" name="Date Placeholder 3"/>
           <p:cNvSpPr>
             <a:spLocks noGrp="1"/>
@@ -10511,7 +10081,7 @@
           <a:lstStyle/>
           <a:p>
             <a:r>
-              <a:rPr lang="en-GB" smtClean="0"/>
+              <a:rPr lang="en-GB"/>
               <a:t>30/10/2014</a:t>
             </a:r>
             <a:endParaRPr lang="en-US"/>
@@ -10534,10 +10104,9 @@
           <a:lstStyle/>
           <a:p>
             <a:r>
-              <a:rPr lang="en-US" smtClean="0"/>
+              <a:rPr lang="en-US"/>
               <a:t>Chapter 10 Dependable Systems</a:t>
             </a:r>
-            <a:endParaRPr lang="en-US"/>
           </a:p>
         </p:txBody>
       </p:sp>
@@ -10574,7 +10143,7 @@
   <p:clrMapOvr>
     <a:masterClrMapping/>
   </p:clrMapOvr>
-  <p:transition xmlns:p14="http://schemas.microsoft.com/office/powerpoint/2010/main" spd="med">
+  <p:transition spd="med">
     <p:wipe dir="r"/>
   </p:transition>
 </p:sld>
@@ -10619,10 +10188,9 @@
           <a:p>
             <a:pPr algn="ctr"/>
             <a:r>
-              <a:rPr lang="en-US" dirty="0" smtClean="0"/>
+              <a:rPr lang="en-US" dirty="0"/>
               <a:t>Formal methods and dependability</a:t>
             </a:r>
-            <a:endParaRPr lang="en-US" dirty="0"/>
           </a:p>
         </p:txBody>
       </p:sp>
@@ -10642,7 +10210,7 @@
           <a:lstStyle/>
           <a:p>
             <a:r>
-              <a:rPr lang="en-GB" smtClean="0"/>
+              <a:rPr lang="en-GB"/>
               <a:t>30/10/2014</a:t>
             </a:r>
             <a:endParaRPr lang="en-US"/>
@@ -10665,10 +10233,9 @@
           <a:lstStyle/>
           <a:p>
             <a:r>
-              <a:rPr lang="en-US" smtClean="0"/>
+              <a:rPr lang="en-US"/>
               <a:t>Chapter 10 Dependable Systems</a:t>
             </a:r>
-            <a:endParaRPr lang="en-US"/>
           </a:p>
         </p:txBody>
       </p:sp>
@@ -10705,7 +10272,7 @@
   <p:clrMapOvr>
     <a:masterClrMapping/>
   </p:clrMapOvr>
-  <p:transition xmlns:p14="http://schemas.microsoft.com/office/powerpoint/2010/main" spd="med">
+  <p:transition spd="med">
     <p:wipe dir="r"/>
   </p:transition>
 </p:sld>
@@ -10766,28 +10333,20 @@
           <a:lstStyle/>
           <a:p>
             <a:r>
-              <a:rPr lang="en-US" dirty="0" smtClean="0"/>
+              <a:rPr lang="en-US" dirty="0"/>
               <a:t>System failures may have widespread effects with large numbers of people affected by the failure.</a:t>
             </a:r>
           </a:p>
           <a:p>
             <a:r>
-              <a:rPr lang="en-US" dirty="0" smtClean="0"/>
-              <a:t>Systems </a:t>
-            </a:r>
-            <a:r>
-              <a:rPr lang="en-US" dirty="0"/>
-              <a:t>that are not dependable and are unreliable, unsafe or insecure may be rejected by their users.</a:t>
-            </a:r>
-          </a:p>
-          <a:p>
-            <a:r>
-              <a:rPr lang="en-US" dirty="0"/>
-              <a:t>The costs of system failure may be very </a:t>
-            </a:r>
-            <a:r>
-              <a:rPr lang="en-US" dirty="0" smtClean="0"/>
-              <a:t>high if the failure leads to economic losses or physical damage.</a:t>
+              <a:rPr lang="en-US" dirty="0"/>
+              <a:t>Systems that are not dependable and are unreliable, unsafe or insecure may be rejected by their users.</a:t>
+            </a:r>
+          </a:p>
+          <a:p>
+            <a:r>
+              <a:rPr lang="en-US" dirty="0"/>
+              <a:t>The costs of system failure may be very high if the failure leads to economic losses or physical damage.</a:t>
             </a:r>
           </a:p>
           <a:p>
@@ -10838,10 +10397,9 @@
           <a:lstStyle/>
           <a:p>
             <a:r>
-              <a:rPr lang="en-US" smtClean="0"/>
+              <a:rPr lang="en-US"/>
               <a:t>Chapter 10 Dependable Systems</a:t>
             </a:r>
-            <a:endParaRPr lang="en-US"/>
           </a:p>
         </p:txBody>
       </p:sp>
@@ -10861,7 +10419,7 @@
           <a:lstStyle/>
           <a:p>
             <a:r>
-              <a:rPr lang="en-GB" smtClean="0"/>
+              <a:rPr lang="en-GB"/>
               <a:t>30/10/2014</a:t>
             </a:r>
             <a:endParaRPr lang="en-US"/>
@@ -10878,7 +10436,7 @@
   <p:clrMapOvr>
     <a:masterClrMapping/>
   </p:clrMapOvr>
-  <p:transition xmlns:p14="http://schemas.microsoft.com/office/powerpoint/2010/main" spd="med">
+  <p:transition spd="med">
     <p:wipe dir="r"/>
   </p:transition>
 </p:sld>
@@ -10918,13 +10476,8 @@
           <a:p>
             <a:r>
               <a:rPr lang="en-GB" dirty="0"/>
-              <a:t>Formal</a:t>
-            </a:r>
-            <a:r>
-              <a:rPr lang="en-GB" dirty="0" smtClean="0"/>
-              <a:t> specification</a:t>
-            </a:r>
-            <a:endParaRPr lang="en-GB" dirty="0"/>
+              <a:t>Formal specification</a:t>
+            </a:r>
           </a:p>
         </p:txBody>
       </p:sp>
@@ -10945,23 +10498,15 @@
           <a:p>
             <a:r>
               <a:rPr lang="en-GB" sz="2400" dirty="0"/>
-              <a:t>Formal </a:t>
-            </a:r>
-            <a:r>
-              <a:rPr lang="en-GB" sz="2400" dirty="0" smtClean="0"/>
-              <a:t>methods are approaches to software development that are</a:t>
+              <a:t>Formal methods are approaches to software development that are</a:t>
             </a:r>
             <a:r>
               <a:rPr lang="en-GB" dirty="0"/>
               <a:t> </a:t>
             </a:r>
             <a:r>
-              <a:rPr lang="en-GB" sz="2400" dirty="0" smtClean="0"/>
-              <a:t>based </a:t>
-            </a:r>
-            <a:r>
               <a:rPr lang="en-GB" sz="2400" dirty="0"/>
-              <a:t>on mathematical representation and analysis of software.</a:t>
+              <a:t>based on mathematical representation and analysis of software.</a:t>
             </a:r>
           </a:p>
           <a:p>
@@ -10995,19 +10540,14 @@
             <a:pPr lvl="1"/>
             <a:r>
               <a:rPr lang="en-GB" sz="2000" dirty="0"/>
-              <a:t>Program verification</a:t>
-            </a:r>
-            <a:r>
-              <a:rPr lang="en-GB" sz="2000" dirty="0" smtClean="0"/>
-              <a:t>.</a:t>
-            </a:r>
-          </a:p>
-          <a:p>
-            <a:r>
-              <a:rPr lang="en-GB" sz="2400" dirty="0" smtClean="0"/>
+              <a:t>Program verification.</a:t>
+            </a:r>
+          </a:p>
+          <a:p>
+            <a:r>
+              <a:rPr lang="en-GB" sz="2400" dirty="0"/>
               <a:t>Formal methods significantly reduce some types of programming errors and can be cost-effective for dependable systems engineering.</a:t>
             </a:r>
-            <a:endParaRPr lang="en-GB" sz="2400" dirty="0"/>
           </a:p>
         </p:txBody>
       </p:sp>
@@ -11051,10 +10591,9 @@
           <a:lstStyle/>
           <a:p>
             <a:r>
-              <a:rPr lang="en-US" smtClean="0"/>
+              <a:rPr lang="en-US"/>
               <a:t>Chapter 10 Dependable Systems</a:t>
             </a:r>
-            <a:endParaRPr lang="en-US"/>
           </a:p>
         </p:txBody>
       </p:sp>
@@ -11074,7 +10613,7 @@
           <a:lstStyle/>
           <a:p>
             <a:r>
-              <a:rPr lang="en-GB" smtClean="0"/>
+              <a:rPr lang="en-GB"/>
               <a:t>30/10/2014</a:t>
             </a:r>
             <a:endParaRPr lang="en-US"/>
@@ -11091,16 +10630,9 @@
   <p:clrMapOvr>
     <a:masterClrMapping/>
   </p:clrMapOvr>
-  <p:transition xmlns:p14="http://schemas.microsoft.com/office/powerpoint/2010/main" spd="med">
+  <p:transition spd="med">
     <p:wipe dir="r"/>
   </p:transition>
-  <p:timing>
-    <p:tnLst>
-      <p:par>
-        <p:cTn xmlns:p14="http://schemas.microsoft.com/office/powerpoint/2010/main" id="1" dur="indefinite" restart="never" nodeType="tmRoot"/>
-      </p:par>
-    </p:tnLst>
-  </p:timing>
 </p:sld>
 </file>
 
@@ -11137,10 +10669,9 @@
           <a:lstStyle/>
           <a:p>
             <a:r>
-              <a:rPr lang="en-US" dirty="0" smtClean="0"/>
+              <a:rPr lang="en-US" dirty="0"/>
               <a:t>Formal approaches</a:t>
             </a:r>
-            <a:endParaRPr lang="en-US" dirty="0"/>
           </a:p>
         </p:txBody>
       </p:sp>
@@ -11160,52 +10691,51 @@
           <a:lstStyle/>
           <a:p>
             <a:r>
-              <a:rPr lang="en-US" dirty="0" smtClean="0"/>
+              <a:rPr lang="en-US" dirty="0"/>
               <a:t>Verification-based approaches</a:t>
             </a:r>
           </a:p>
           <a:p>
             <a:pPr lvl="1"/>
             <a:r>
-              <a:rPr lang="en-US" dirty="0" smtClean="0"/>
+              <a:rPr lang="en-US" dirty="0"/>
               <a:t>Different representations of a software system such as a specification and a program implementing that specification are proved to be equivalent. </a:t>
             </a:r>
           </a:p>
           <a:p>
             <a:pPr lvl="1"/>
             <a:r>
-              <a:rPr lang="en-US" dirty="0" smtClean="0"/>
+              <a:rPr lang="en-US" dirty="0"/>
               <a:t>This demonstrates the absence of implementation errors.</a:t>
             </a:r>
           </a:p>
           <a:p>
             <a:r>
-              <a:rPr lang="en-US" dirty="0" smtClean="0"/>
+              <a:rPr lang="en-US" dirty="0"/>
               <a:t>Refinement-based approaches</a:t>
             </a:r>
           </a:p>
           <a:p>
             <a:pPr lvl="1"/>
             <a:r>
-              <a:rPr lang="en-US" dirty="0" smtClean="0"/>
+              <a:rPr lang="en-US" dirty="0"/>
               <a:t>A representation of a system is systematically transformed into another, lower-level </a:t>
             </a:r>
             <a:r>
-              <a:rPr lang="en-US" dirty="0" err="1" smtClean="0"/>
+              <a:rPr lang="en-US" dirty="0" err="1"/>
               <a:t>represention</a:t>
             </a:r>
             <a:r>
-              <a:rPr lang="en-US" dirty="0" smtClean="0"/>
+              <a:rPr lang="en-US" dirty="0"/>
               <a:t> e.g. a specification is transformed automatically into an implementation.</a:t>
             </a:r>
           </a:p>
           <a:p>
             <a:pPr lvl="1"/>
             <a:r>
-              <a:rPr lang="en-US" dirty="0" smtClean="0"/>
+              <a:rPr lang="en-US" dirty="0"/>
               <a:t>This means that, if the transformation is correct, the representations are equivalent.</a:t>
             </a:r>
-            <a:endParaRPr lang="en-US" dirty="0"/>
           </a:p>
         </p:txBody>
       </p:sp>
@@ -11225,7 +10755,7 @@
           <a:lstStyle/>
           <a:p>
             <a:r>
-              <a:rPr lang="en-GB" smtClean="0"/>
+              <a:rPr lang="en-GB"/>
               <a:t>30/10/2014</a:t>
             </a:r>
             <a:endParaRPr lang="en-US"/>
@@ -11248,10 +10778,9 @@
           <a:lstStyle/>
           <a:p>
             <a:r>
-              <a:rPr lang="en-US" smtClean="0"/>
+              <a:rPr lang="en-US"/>
               <a:t>Chapter 10 Dependable Systems</a:t>
             </a:r>
-            <a:endParaRPr lang="en-US"/>
           </a:p>
         </p:txBody>
       </p:sp>
@@ -11288,7 +10817,7 @@
   <p:clrMapOvr>
     <a:masterClrMapping/>
   </p:clrMapOvr>
-  <p:transition xmlns:p14="http://schemas.microsoft.com/office/powerpoint/2010/main" spd="med">
+  <p:transition spd="med">
     <p:wipe dir="r"/>
   </p:transition>
 </p:sld>
@@ -11358,15 +10887,7 @@
           <a:p>
             <a:r>
               <a:rPr lang="en-GB" dirty="0"/>
-              <a:t>Consequently, their main area of applicability is in </a:t>
-            </a:r>
-            <a:r>
-              <a:rPr lang="en-GB" dirty="0" smtClean="0"/>
-              <a:t>dependable systems </a:t>
-            </a:r>
-            <a:r>
-              <a:rPr lang="en-GB" dirty="0"/>
-              <a:t>engineering. There have been several successful projects where formal methods have been used in this area.</a:t>
+              <a:t>Consequently, their main area of applicability is in dependable systems engineering. There have been several successful projects where formal methods have been used in this area.</a:t>
             </a:r>
           </a:p>
           <a:p>
@@ -11417,10 +10938,9 @@
           <a:lstStyle/>
           <a:p>
             <a:r>
-              <a:rPr lang="en-US" smtClean="0"/>
+              <a:rPr lang="en-US"/>
               <a:t>Chapter 10 Dependable Systems</a:t>
             </a:r>
-            <a:endParaRPr lang="en-US"/>
           </a:p>
         </p:txBody>
       </p:sp>
@@ -11440,7 +10960,7 @@
           <a:lstStyle/>
           <a:p>
             <a:r>
-              <a:rPr lang="en-GB" smtClean="0"/>
+              <a:rPr lang="en-GB"/>
               <a:t>30/10/2014</a:t>
             </a:r>
             <a:endParaRPr lang="en-US"/>
@@ -11457,16 +10977,9 @@
   <p:clrMapOvr>
     <a:masterClrMapping/>
   </p:clrMapOvr>
-  <p:transition xmlns:p14="http://schemas.microsoft.com/office/powerpoint/2010/main" spd="med">
+  <p:transition spd="med">
     <p:wipe dir="r"/>
   </p:transition>
-  <p:timing>
-    <p:tnLst>
-      <p:par>
-        <p:cTn xmlns:p14="http://schemas.microsoft.com/office/powerpoint/2010/main" id="1" dur="indefinite" restart="never" nodeType="tmRoot"/>
-      </p:par>
-    </p:tnLst>
-  </p:timing>
 </p:sld>
 </file>
 
@@ -11503,10 +11016,9 @@
           <a:lstStyle/>
           <a:p>
             <a:r>
-              <a:rPr lang="en-US" dirty="0" smtClean="0"/>
+              <a:rPr lang="en-US" dirty="0"/>
               <a:t>Classes of error</a:t>
             </a:r>
-            <a:endParaRPr lang="en-US" dirty="0"/>
           </a:p>
         </p:txBody>
       </p:sp>
@@ -11529,47 +11041,25 @@
               <a:rPr lang="en-GB" dirty="0"/>
               <a:t>Specification and design errors and omissions. </a:t>
             </a:r>
-            <a:endParaRPr lang="en-GB" dirty="0" smtClean="0"/>
           </a:p>
           <a:p>
             <a:pPr lvl="1"/>
             <a:r>
-              <a:rPr lang="en-GB" dirty="0" smtClean="0"/>
-              <a:t>Developing </a:t>
-            </a:r>
-            <a:r>
               <a:rPr lang="en-GB" dirty="0"/>
-              <a:t>and analysing a formal model of the software may reveal errors and omissions in the software requirements. If the model is generated automatically or systematically from source code, analysis using model checking can </a:t>
-            </a:r>
-            <a:r>
-              <a:rPr lang="en-GB" dirty="0" smtClean="0"/>
-              <a:t>find undesirable </a:t>
-            </a:r>
+              <a:t>Developing and analysing a formal model of the software may reveal errors and omissions in the software requirements. If the model is generated automatically or systematically from source code, analysis using model checking can find undesirable states that may occur such as deadlock in a concurrent system.</a:t>
+            </a:r>
+          </a:p>
+          <a:p>
             <a:r>
               <a:rPr lang="en-GB" dirty="0"/>
-              <a:t>states that may occur such as deadlock in a concurrent system.</a:t>
-            </a:r>
-          </a:p>
-          <a:p>
-            <a:r>
-              <a:rPr lang="en-GB" dirty="0" smtClean="0"/>
-              <a:t>Inconsistences </a:t>
-            </a:r>
+              <a:t>Inconsistences between a specification and a program. </a:t>
+            </a:r>
+          </a:p>
+          <a:p>
+            <a:pPr lvl="1"/>
             <a:r>
               <a:rPr lang="en-GB" dirty="0"/>
-              <a:t>between a specification and a program. </a:t>
-            </a:r>
-            <a:endParaRPr lang="en-GB" dirty="0" smtClean="0"/>
-          </a:p>
-          <a:p>
-            <a:pPr lvl="1"/>
-            <a:r>
-              <a:rPr lang="en-GB" dirty="0" smtClean="0"/>
-              <a:t>If </a:t>
-            </a:r>
-            <a:r>
-              <a:rPr lang="en-GB" dirty="0"/>
-              <a:t>a refinement method is used, mistakes made by developers that make the software inconsistent with the specification are avoided. Program proving discovers inconsistencies between a program and its specification.</a:t>
+              <a:t>If a refinement method is used, mistakes made by developers that make the software inconsistent with the specification are avoided. Program proving discovers inconsistencies between a program and its specification.</a:t>
             </a:r>
           </a:p>
           <a:p>
@@ -11593,7 +11083,7 @@
           <a:lstStyle/>
           <a:p>
             <a:r>
-              <a:rPr lang="en-GB" smtClean="0"/>
+              <a:rPr lang="en-GB"/>
               <a:t>30/10/2014</a:t>
             </a:r>
             <a:endParaRPr lang="en-US"/>
@@ -11616,10 +11106,9 @@
           <a:lstStyle/>
           <a:p>
             <a:r>
-              <a:rPr lang="en-US" smtClean="0"/>
+              <a:rPr lang="en-US"/>
               <a:t>Chapter 10 Dependable Systems</a:t>
             </a:r>
-            <a:endParaRPr lang="en-US"/>
           </a:p>
         </p:txBody>
       </p:sp>
@@ -11656,7 +11145,7 @@
   <p:clrMapOvr>
     <a:masterClrMapping/>
   </p:clrMapOvr>
-  <p:transition xmlns:p14="http://schemas.microsoft.com/office/powerpoint/2010/main" spd="med">
+  <p:transition spd="med">
     <p:wipe dir="r"/>
   </p:transition>
 </p:sld>
@@ -11695,10 +11184,9 @@
           <a:lstStyle/>
           <a:p>
             <a:r>
-              <a:rPr lang="en-US" dirty="0" smtClean="0"/>
+              <a:rPr lang="en-US" dirty="0"/>
               <a:t>Benefits of formal specification</a:t>
             </a:r>
-            <a:endParaRPr lang="en-US" dirty="0"/>
           </a:p>
         </p:txBody>
       </p:sp>
@@ -11718,28 +11206,27 @@
           <a:lstStyle/>
           <a:p>
             <a:r>
-              <a:rPr lang="en-US" sz="2200" dirty="0" smtClean="0"/>
+              <a:rPr lang="en-US" sz="2200" dirty="0"/>
               <a:t>Developing a formal specification requires the system requirements to be analyzed in detail. This helps to detect problems, inconsistencies and incompleteness in the requirements.</a:t>
             </a:r>
           </a:p>
           <a:p>
             <a:r>
-              <a:rPr lang="en-US" sz="2200" dirty="0" smtClean="0"/>
+              <a:rPr lang="en-US" sz="2200" dirty="0"/>
               <a:t>As the specification is expressed in a formal language, it can be automatically analyzed to discover inconsistencies and incompleteness.</a:t>
             </a:r>
           </a:p>
           <a:p>
             <a:r>
-              <a:rPr lang="en-US" sz="2200" dirty="0" smtClean="0"/>
+              <a:rPr lang="en-US" sz="2200" dirty="0"/>
               <a:t>If you use a formal method such as the B method, you can transform the formal specification into a ‘correct’ program.</a:t>
             </a:r>
           </a:p>
           <a:p>
             <a:r>
-              <a:rPr lang="en-US" sz="2200" dirty="0" smtClean="0"/>
+              <a:rPr lang="en-US" sz="2200" dirty="0"/>
               <a:t>Program testing costs may be reduced if the program is formally verified against its specification.</a:t>
             </a:r>
-            <a:endParaRPr lang="en-US" sz="2200" dirty="0"/>
           </a:p>
         </p:txBody>
       </p:sp>
@@ -11783,10 +11270,9 @@
           <a:lstStyle/>
           <a:p>
             <a:r>
-              <a:rPr lang="en-US" smtClean="0"/>
+              <a:rPr lang="en-US"/>
               <a:t>Chapter 10 Dependable Systems</a:t>
             </a:r>
-            <a:endParaRPr lang="en-US"/>
           </a:p>
         </p:txBody>
       </p:sp>
@@ -11806,7 +11292,7 @@
           <a:lstStyle/>
           <a:p>
             <a:r>
-              <a:rPr lang="en-GB" smtClean="0"/>
+              <a:rPr lang="en-GB"/>
               <a:t>30/10/2014</a:t>
             </a:r>
             <a:endParaRPr lang="en-US"/>
@@ -11823,16 +11309,9 @@
   <p:clrMapOvr>
     <a:masterClrMapping/>
   </p:clrMapOvr>
-  <p:transition xmlns:p14="http://schemas.microsoft.com/office/powerpoint/2010/main" spd="med">
+  <p:transition spd="med">
     <p:wipe dir="r"/>
   </p:transition>
-  <p:timing>
-    <p:tnLst>
-      <p:par>
-        <p:cTn xmlns:p14="http://schemas.microsoft.com/office/powerpoint/2010/main" id="1" dur="indefinite" restart="never" nodeType="tmRoot"/>
-      </p:par>
-    </p:tnLst>
-  </p:timing>
 </p:sld>
 </file>
 
@@ -11897,11 +11376,7 @@
             </a:pPr>
             <a:r>
               <a:rPr lang="en-GB" sz="2400" dirty="0"/>
-              <a:t>Formal methods have</a:t>
-            </a:r>
-            <a:r>
-              <a:rPr lang="en-GB" sz="2400" dirty="0" smtClean="0"/>
-              <a:t> had limited impact on practical software development:</a:t>
+              <a:t>Formal methods have had limited impact on practical software development:</a:t>
             </a:r>
           </a:p>
           <a:p>
@@ -11911,14 +11386,14 @@
               </a:lnSpc>
             </a:pPr>
             <a:r>
-              <a:rPr lang="en-GB" sz="2000" dirty="0" smtClean="0"/>
+              <a:rPr lang="en-GB" sz="2000" dirty="0"/>
               <a:t>Problem owners cannot understand a formal specification and so cannot </a:t>
             </a:r>
             <a:r>
-              <a:rPr lang="en-GB" dirty="0" smtClean="0"/>
+              <a:rPr lang="en-GB" dirty="0"/>
               <a:t>assess if it is an accurate representation of their requirements.</a:t>
             </a:r>
-            <a:endParaRPr lang="en-GB" sz="2000" dirty="0" smtClean="0"/>
+            <a:endParaRPr lang="en-GB" sz="2000" dirty="0"/>
           </a:p>
           <a:p>
             <a:pPr lvl="1">
@@ -11927,14 +11402,14 @@
               </a:lnSpc>
             </a:pPr>
             <a:r>
-              <a:rPr lang="en-GB" sz="2000" dirty="0" smtClean="0"/>
+              <a:rPr lang="en-GB" sz="2000" dirty="0"/>
               <a:t>It is easy to assess the costs of developing a formal specification but harder to assess the benefits. Managers may therefore be </a:t>
             </a:r>
             <a:r>
-              <a:rPr lang="en-GB" dirty="0" smtClean="0"/>
+              <a:rPr lang="en-GB" dirty="0"/>
               <a:t>unwilling to invest in formal methods.</a:t>
             </a:r>
-            <a:endParaRPr lang="en-GB" sz="2000" dirty="0" smtClean="0"/>
+            <a:endParaRPr lang="en-GB" sz="2000" dirty="0"/>
           </a:p>
           <a:p>
             <a:pPr lvl="1">
@@ -11943,14 +11418,14 @@
               </a:lnSpc>
             </a:pPr>
             <a:r>
-              <a:rPr lang="en-GB" sz="2000" dirty="0" smtClean="0"/>
+              <a:rPr lang="en-GB" sz="2000" dirty="0"/>
               <a:t>Software engineers </a:t>
             </a:r>
             <a:r>
-              <a:rPr lang="en-GB" dirty="0" smtClean="0"/>
+              <a:rPr lang="en-GB" dirty="0"/>
               <a:t>are  unfamiliar with this approach and are therefore reluctant to propose the use of FM.</a:t>
             </a:r>
-            <a:endParaRPr lang="en-GB" sz="2000" dirty="0" smtClean="0"/>
+            <a:endParaRPr lang="en-GB" sz="2000" dirty="0"/>
           </a:p>
           <a:p>
             <a:pPr lvl="1">
@@ -11960,11 +11435,7 @@
             </a:pPr>
             <a:r>
               <a:rPr lang="en-GB" sz="2000" dirty="0"/>
-              <a:t>Formal methods are still hard to scale up to large systems</a:t>
-            </a:r>
-            <a:r>
-              <a:rPr lang="en-GB" sz="2000" dirty="0" smtClean="0"/>
-              <a:t>.</a:t>
+              <a:t>Formal methods are still hard to scale up to large systems.</a:t>
             </a:r>
           </a:p>
           <a:p>
@@ -11974,7 +11445,7 @@
               </a:lnSpc>
             </a:pPr>
             <a:r>
-              <a:rPr lang="en-GB" dirty="0" smtClean="0"/>
+              <a:rPr lang="en-GB" dirty="0"/>
               <a:t>Formal specification is not really compatible with agile development methods.</a:t>
             </a:r>
             <a:endParaRPr lang="en-GB" sz="2000" dirty="0"/>
@@ -12021,10 +11492,9 @@
           <a:lstStyle/>
           <a:p>
             <a:r>
-              <a:rPr lang="en-US" smtClean="0"/>
+              <a:rPr lang="en-US"/>
               <a:t>Chapter 10 Dependable Systems</a:t>
             </a:r>
-            <a:endParaRPr lang="en-US"/>
           </a:p>
         </p:txBody>
       </p:sp>
@@ -12044,7 +11514,7 @@
           <a:lstStyle/>
           <a:p>
             <a:r>
-              <a:rPr lang="en-GB" smtClean="0"/>
+              <a:rPr lang="en-GB"/>
               <a:t>30/10/2014</a:t>
             </a:r>
             <a:endParaRPr lang="en-US"/>
@@ -12061,16 +11531,9 @@
   <p:clrMapOvr>
     <a:masterClrMapping/>
   </p:clrMapOvr>
-  <p:transition xmlns:p14="http://schemas.microsoft.com/office/powerpoint/2010/main" spd="med">
+  <p:transition spd="med">
     <p:wipe dir="r"/>
   </p:transition>
-  <p:timing>
-    <p:tnLst>
-      <p:par>
-        <p:cTn xmlns:p14="http://schemas.microsoft.com/office/powerpoint/2010/main" id="1" dur="indefinite" restart="never" nodeType="tmRoot"/>
-      </p:par>
-    </p:tnLst>
-  </p:timing>
 </p:sld>
 </file>
 
@@ -12107,10 +11570,9 @@
           <a:lstStyle/>
           <a:p>
             <a:r>
-              <a:rPr lang="en-US" dirty="0" smtClean="0"/>
+              <a:rPr lang="en-US" dirty="0"/>
               <a:t>Key points</a:t>
             </a:r>
-            <a:endParaRPr lang="en-US" dirty="0"/>
           </a:p>
         </p:txBody>
       </p:sp>
@@ -12131,31 +11593,7 @@
           <a:p>
             <a:r>
               <a:rPr lang="en-GB" dirty="0"/>
-              <a:t>System dependability is important because failure of critical </a:t>
-            </a:r>
-            <a:r>
-              <a:rPr lang="en-GB" dirty="0" smtClean="0"/>
-              <a:t>systems </a:t>
-            </a:r>
-            <a:r>
-              <a:rPr lang="en-GB" dirty="0"/>
-              <a:t>can lead to </a:t>
-            </a:r>
-            <a:r>
-              <a:rPr lang="en-GB" dirty="0" smtClean="0"/>
-              <a:t>economic </a:t>
-            </a:r>
-            <a:r>
-              <a:rPr lang="en-GB" dirty="0"/>
-              <a:t>losses, </a:t>
-            </a:r>
-            <a:r>
-              <a:rPr lang="en-GB" dirty="0" smtClean="0"/>
-              <a:t>information </a:t>
-            </a:r>
-            <a:r>
-              <a:rPr lang="en-GB" dirty="0"/>
-              <a:t>loss, physical damage or threats to human life.  </a:t>
+              <a:t>System dependability is important because failure of critical systems can lead to economic losses, information loss, physical damage or threats to human life.  </a:t>
             </a:r>
           </a:p>
           <a:p>
@@ -12191,7 +11629,7 @@
           <a:lstStyle/>
           <a:p>
             <a:r>
-              <a:rPr lang="en-GB" smtClean="0"/>
+              <a:rPr lang="en-GB"/>
               <a:t>30/10/2014</a:t>
             </a:r>
             <a:endParaRPr lang="en-US"/>
@@ -12214,10 +11652,9 @@
           <a:lstStyle/>
           <a:p>
             <a:r>
-              <a:rPr lang="en-US" smtClean="0"/>
+              <a:rPr lang="en-US"/>
               <a:t>Chapter 10 Dependable Systems</a:t>
             </a:r>
-            <a:endParaRPr lang="en-US"/>
           </a:p>
         </p:txBody>
       </p:sp>
@@ -12254,7 +11691,7 @@
   <p:clrMapOvr>
     <a:masterClrMapping/>
   </p:clrMapOvr>
-  <p:transition xmlns:p14="http://schemas.microsoft.com/office/powerpoint/2010/main" spd="med">
+  <p:transition spd="med">
     <p:wipe dir="r"/>
   </p:transition>
 </p:sld>
@@ -12293,52 +11730,59 @@
           <a:lstStyle/>
           <a:p>
             <a:r>
-              <a:rPr lang="en-US" dirty="0" smtClean="0"/>
+              <a:rPr lang="en-US" dirty="0"/>
               <a:t>Key points</a:t>
             </a:r>
+          </a:p>
+        </p:txBody>
+      </p:sp>
+      <p:sp>
+        <p:nvSpPr>
+          <p:cNvPr id="3" name="Content Placeholder 2"/>
+          <p:cNvSpPr>
+            <a:spLocks noGrp="1"/>
+          </p:cNvSpPr>
+          <p:nvPr>
+            <p:ph idx="1"/>
+          </p:nvPr>
+        </p:nvSpPr>
+        <p:spPr/>
+        <p:txBody>
+          <a:bodyPr/>
+          <a:lstStyle/>
+          <a:p>
+            <a:r>
+              <a:rPr lang="en-US" dirty="0"/>
+              <a:t>The use of a dependable, repeatable process is essential if faults in a system are to be minimized. The process should include verification and validation activities at all stages, from requirements definition through to system implementation.</a:t>
+            </a:r>
+            <a:endParaRPr lang="en-GB" dirty="0"/>
+          </a:p>
+          <a:p>
+            <a:r>
+              <a:rPr lang="en-US" dirty="0"/>
+              <a:t>The use of redundancy and diversity in hardware, software processes and software systems is essential to the development of dependable systems.</a:t>
+            </a:r>
+            <a:endParaRPr lang="en-GB" dirty="0"/>
+          </a:p>
+          <a:p>
+            <a:r>
+              <a:rPr lang="en-GB" dirty="0"/>
+              <a:t>Formal methods, where a formal model of a system is used as a basis for development help reduce the number </a:t>
+            </a:r>
+            <a:r>
+              <a:rPr lang="en-GB"/>
+              <a:t>of and </a:t>
+            </a:r>
+            <a:r>
+              <a:rPr lang="en-GB" dirty="0"/>
+              <a:t>implementation errors in a system. </a:t>
+            </a:r>
             <a:endParaRPr lang="en-US" dirty="0"/>
           </a:p>
         </p:txBody>
       </p:sp>
       <p:sp>
         <p:nvSpPr>
-          <p:cNvPr id="3" name="Content Placeholder 2"/>
-          <p:cNvSpPr>
-            <a:spLocks noGrp="1"/>
-          </p:cNvSpPr>
-          <p:nvPr>
-            <p:ph idx="1"/>
-          </p:nvPr>
-        </p:nvSpPr>
-        <p:spPr/>
-        <p:txBody>
-          <a:bodyPr/>
-          <a:lstStyle/>
-          <a:p>
-            <a:r>
-              <a:rPr lang="en-US" dirty="0"/>
-              <a:t>The use of a dependable, repeatable process is essential if faults in a system are to be minimized. The process should include verification and validation activities at all stages, from requirements definition through to system implementation.</a:t>
-            </a:r>
-            <a:endParaRPr lang="en-GB" dirty="0"/>
-          </a:p>
-          <a:p>
-            <a:r>
-              <a:rPr lang="en-US" dirty="0"/>
-              <a:t>The use of redundancy and diversity in hardware, software processes and software systems is essential to the development of dependable systems.</a:t>
-            </a:r>
-            <a:endParaRPr lang="en-GB" dirty="0"/>
-          </a:p>
-          <a:p>
-            <a:r>
-              <a:rPr lang="en-GB" dirty="0"/>
-              <a:t>Formal methods, where a formal model of a system is used as a basis for development help reduce the number of specification and implementation errors in a system. </a:t>
-            </a:r>
-            <a:endParaRPr lang="en-US" dirty="0"/>
-          </a:p>
-        </p:txBody>
-      </p:sp>
-      <p:sp>
-        <p:nvSpPr>
           <p:cNvPr id="4" name="Date Placeholder 3"/>
           <p:cNvSpPr>
             <a:spLocks noGrp="1"/>
@@ -12353,7 +11797,7 @@
           <a:lstStyle/>
           <a:p>
             <a:r>
-              <a:rPr lang="en-GB" smtClean="0"/>
+              <a:rPr lang="en-GB"/>
               <a:t>30/10/2014</a:t>
             </a:r>
             <a:endParaRPr lang="en-US"/>
@@ -12376,10 +11820,9 @@
           <a:lstStyle/>
           <a:p>
             <a:r>
-              <a:rPr lang="en-US" smtClean="0"/>
+              <a:rPr lang="en-US"/>
               <a:t>Chapter 10 Dependable Systems</a:t>
             </a:r>
-            <a:endParaRPr lang="en-US"/>
           </a:p>
         </p:txBody>
       </p:sp>
@@ -12416,7 +11859,7 @@
   <p:clrMapOvr>
     <a:masterClrMapping/>
   </p:clrMapOvr>
-  <p:transition xmlns:p14="http://schemas.microsoft.com/office/powerpoint/2010/main" spd="med">
+  <p:transition spd="med">
     <p:wipe dir="r"/>
   </p:transition>
 </p:sld>
@@ -12455,10 +11898,9 @@
           <a:lstStyle/>
           <a:p>
             <a:r>
-              <a:rPr lang="en-US" dirty="0" smtClean="0"/>
+              <a:rPr lang="en-US" dirty="0"/>
               <a:t>Causes of failure</a:t>
             </a:r>
-            <a:endParaRPr lang="en-US" dirty="0"/>
           </a:p>
         </p:txBody>
       </p:sp>
@@ -12539,13 +11981,8 @@
             </a:pPr>
             <a:r>
               <a:rPr lang="en-US" dirty="0"/>
-              <a:t>Human operators make mistakes. Now perhaps the largest single cause of system </a:t>
-            </a:r>
-            <a:r>
-              <a:rPr lang="en-US" dirty="0" smtClean="0"/>
-              <a:t>failures in socio-technical systems.</a:t>
-            </a:r>
-            <a:endParaRPr lang="en-US" dirty="0"/>
+              <a:t>Human operators make mistakes. Now perhaps the largest single cause of system failures in socio-technical systems.</a:t>
+            </a:r>
           </a:p>
         </p:txBody>
       </p:sp>
@@ -12589,10 +12026,9 @@
           <a:lstStyle/>
           <a:p>
             <a:r>
-              <a:rPr lang="en-US" smtClean="0"/>
+              <a:rPr lang="en-US"/>
               <a:t>Chapter 10 Dependable Systems</a:t>
             </a:r>
-            <a:endParaRPr lang="en-US"/>
           </a:p>
         </p:txBody>
       </p:sp>
@@ -12612,7 +12048,7 @@
           <a:lstStyle/>
           <a:p>
             <a:r>
-              <a:rPr lang="en-GB" smtClean="0"/>
+              <a:rPr lang="en-GB"/>
               <a:t>30/10/2014</a:t>
             </a:r>
             <a:endParaRPr lang="en-US"/>
@@ -12629,7 +12065,7 @@
   <p:clrMapOvr>
     <a:masterClrMapping/>
   </p:clrMapOvr>
-  <p:transition xmlns:p14="http://schemas.microsoft.com/office/powerpoint/2010/main" spd="med">
+  <p:transition spd="med">
     <p:wipe dir="r"/>
   </p:transition>
 </p:sld>
@@ -12674,10 +12110,9 @@
           <a:p>
             <a:pPr algn="ctr"/>
             <a:r>
-              <a:rPr lang="en-US" dirty="0" smtClean="0"/>
+              <a:rPr lang="en-US" dirty="0"/>
               <a:t>Dependability properties</a:t>
             </a:r>
-            <a:endParaRPr lang="en-US" dirty="0"/>
           </a:p>
         </p:txBody>
       </p:sp>
@@ -12697,7 +12132,7 @@
           <a:lstStyle/>
           <a:p>
             <a:r>
-              <a:rPr lang="en-GB" smtClean="0"/>
+              <a:rPr lang="en-GB"/>
               <a:t>30/10/2014</a:t>
             </a:r>
             <a:endParaRPr lang="en-US"/>
@@ -12720,10 +12155,9 @@
           <a:lstStyle/>
           <a:p>
             <a:r>
-              <a:rPr lang="en-US" smtClean="0"/>
+              <a:rPr lang="en-US"/>
               <a:t>Chapter 10 Dependable Systems</a:t>
             </a:r>
-            <a:endParaRPr lang="en-US"/>
           </a:p>
         </p:txBody>
       </p:sp>
@@ -12760,7 +12194,7 @@
   <p:clrMapOvr>
     <a:masterClrMapping/>
   </p:clrMapOvr>
-  <p:transition xmlns:p14="http://schemas.microsoft.com/office/powerpoint/2010/main" spd="med">
+  <p:transition spd="med">
     <p:wipe dir="r"/>
   </p:transition>
 </p:sld>
@@ -12799,10 +12233,9 @@
           <a:lstStyle/>
           <a:p>
             <a:r>
-              <a:rPr lang="en-US" dirty="0" smtClean="0"/>
+              <a:rPr lang="en-US" dirty="0"/>
               <a:t>The principal dependability properties</a:t>
             </a:r>
-            <a:endParaRPr lang="en-US" dirty="0"/>
           </a:p>
         </p:txBody>
       </p:sp>
@@ -12852,7 +12285,7 @@
           <a:lstStyle/>
           <a:p>
             <a:r>
-              <a:rPr lang="en-GB" smtClean="0"/>
+              <a:rPr lang="en-GB"/>
               <a:t>30/10/2014</a:t>
             </a:r>
             <a:endParaRPr lang="en-US"/>
@@ -12875,10 +12308,9 @@
           <a:lstStyle/>
           <a:p>
             <a:r>
-              <a:rPr lang="en-US" smtClean="0"/>
+              <a:rPr lang="en-US"/>
               <a:t>Chapter 10 Dependable Systems</a:t>
             </a:r>
-            <a:endParaRPr lang="en-US"/>
           </a:p>
         </p:txBody>
       </p:sp>
@@ -12915,7 +12347,7 @@
   <p:clrMapOvr>
     <a:masterClrMapping/>
   </p:clrMapOvr>
-  <p:transition xmlns:p14="http://schemas.microsoft.com/office/powerpoint/2010/main" spd="med">
+  <p:transition spd="med">
     <p:wipe dir="r"/>
   </p:transition>
 </p:sld>
@@ -12954,10 +12386,9 @@
           <a:lstStyle/>
           <a:p>
             <a:r>
-              <a:rPr lang="en-US" dirty="0" smtClean="0"/>
+              <a:rPr lang="en-US" dirty="0"/>
               <a:t>Principal properties</a:t>
             </a:r>
-            <a:endParaRPr lang="en-US" dirty="0"/>
           </a:p>
         </p:txBody>
       </p:sp>
@@ -12982,40 +12413,40 @@
           <a:lstStyle/>
           <a:p>
             <a:r>
-              <a:rPr lang="en-US" dirty="0" smtClean="0"/>
+              <a:rPr lang="en-US" dirty="0"/>
               <a:t>Availability</a:t>
             </a:r>
           </a:p>
           <a:p>
             <a:pPr lvl="1"/>
             <a:r>
-              <a:rPr lang="en-US" dirty="0" smtClean="0"/>
+              <a:rPr lang="en-US" dirty="0"/>
               <a:t>The probability that the system will be up and running and able to deliver useful services to users.</a:t>
             </a:r>
           </a:p>
           <a:p>
             <a:r>
-              <a:rPr lang="en-US" dirty="0" smtClean="0"/>
+              <a:rPr lang="en-US" dirty="0"/>
               <a:t>Reliability</a:t>
             </a:r>
           </a:p>
           <a:p>
             <a:pPr lvl="1"/>
             <a:r>
-              <a:rPr lang="en-US" dirty="0" smtClean="0"/>
+              <a:rPr lang="en-US" dirty="0"/>
               <a:t>The probability that the system will correctly deliver services as expected by users.</a:t>
             </a:r>
           </a:p>
           <a:p>
             <a:r>
-              <a:rPr lang="en-US" dirty="0" smtClean="0"/>
+              <a:rPr lang="en-US" dirty="0"/>
               <a:t>Safety</a:t>
             </a:r>
           </a:p>
           <a:p>
             <a:pPr lvl="1"/>
             <a:r>
-              <a:rPr lang="en-US" dirty="0" smtClean="0"/>
+              <a:rPr lang="en-US" dirty="0"/>
               <a:t>A judgment of how likely it is that the system will cause damage to people or its environment.</a:t>
             </a:r>
           </a:p>
@@ -13061,10 +12492,9 @@
           <a:lstStyle/>
           <a:p>
             <a:r>
-              <a:rPr lang="en-US" smtClean="0"/>
+              <a:rPr lang="en-US"/>
               <a:t>Chapter 10 Dependable Systems</a:t>
             </a:r>
-            <a:endParaRPr lang="en-US"/>
           </a:p>
         </p:txBody>
       </p:sp>
@@ -13084,7 +12514,7 @@
           <a:lstStyle/>
           <a:p>
             <a:r>
-              <a:rPr lang="en-GB" smtClean="0"/>
+              <a:rPr lang="en-GB"/>
               <a:t>30/10/2014</a:t>
             </a:r>
             <a:endParaRPr lang="en-US"/>
@@ -13101,7 +12531,7 @@
   <p:clrMapOvr>
     <a:masterClrMapping/>
   </p:clrMapOvr>
-  <p:transition xmlns:p14="http://schemas.microsoft.com/office/powerpoint/2010/main" spd="med">
+  <p:transition spd="med">
     <p:wipe dir="r"/>
   </p:transition>
 </p:sld>
@@ -13140,10 +12570,9 @@
           <a:lstStyle/>
           <a:p>
             <a:r>
-              <a:rPr lang="en-US" dirty="0" smtClean="0"/>
+              <a:rPr lang="en-US" dirty="0"/>
               <a:t>Principal properties</a:t>
             </a:r>
-            <a:endParaRPr lang="en-US" dirty="0"/>
           </a:p>
         </p:txBody>
       </p:sp>
@@ -13176,17 +12605,16 @@
           </a:p>
           <a:p>
             <a:r>
-              <a:rPr lang="en-US" dirty="0" smtClean="0"/>
+              <a:rPr lang="en-US" dirty="0"/>
               <a:t>Resilience</a:t>
             </a:r>
           </a:p>
           <a:p>
             <a:pPr lvl="1"/>
             <a:r>
-              <a:rPr lang="en-US" dirty="0" smtClean="0"/>
+              <a:rPr lang="en-US" dirty="0"/>
               <a:t>A judgment of how well a system can maintain the continuity of its critical services in the presence of disruptive events such as equipment failure and cyberattacks.</a:t>
             </a:r>
-            <a:endParaRPr lang="en-US" dirty="0"/>
           </a:p>
         </p:txBody>
       </p:sp>
@@ -13206,7 +12634,7 @@
           <a:lstStyle/>
           <a:p>
             <a:r>
-              <a:rPr lang="en-GB" smtClean="0"/>
+              <a:rPr lang="en-GB"/>
               <a:t>30/10/2014</a:t>
             </a:r>
             <a:endParaRPr lang="en-US"/>
@@ -13229,10 +12657,9 @@
           <a:lstStyle/>
           <a:p>
             <a:r>
-              <a:rPr lang="en-US" smtClean="0"/>
+              <a:rPr lang="en-US"/>
               <a:t>Chapter 10 Dependable Systems</a:t>
             </a:r>
-            <a:endParaRPr lang="en-US"/>
           </a:p>
         </p:txBody>
       </p:sp>
@@ -13269,7 +12696,7 @@
   <p:clrMapOvr>
     <a:masterClrMapping/>
   </p:clrMapOvr>
-  <p:transition xmlns:p14="http://schemas.microsoft.com/office/powerpoint/2010/main" spd="med">
+  <p:transition spd="med">
     <p:wipe dir="r"/>
   </p:transition>
 </p:sld>

</xml_diff>